<commit_message>
update module 2 lecture (in progress)
</commit_message>
<xml_diff>
--- a/book/lectures/AUR_2023_Module2_DimensionReduction.pptx
+++ b/book/lectures/AUR_2023_Module2_DimensionReduction.pptx
@@ -5,7 +5,7 @@
     <p:sldMasterId id="2147483648" r:id="rId1"/>
   </p:sldMasterIdLst>
   <p:notesMasterIdLst>
-    <p:notesMasterId r:id="rId24"/>
+    <p:notesMasterId r:id="rId23"/>
   </p:notesMasterIdLst>
   <p:sldIdLst>
     <p:sldId id="256" r:id="rId2"/>
@@ -15,52 +15,51 @@
     <p:sldId id="262" r:id="rId6"/>
     <p:sldId id="274" r:id="rId7"/>
     <p:sldId id="275" r:id="rId8"/>
-    <p:sldId id="277" r:id="rId9"/>
-    <p:sldId id="276" r:id="rId10"/>
-    <p:sldId id="263" r:id="rId11"/>
-    <p:sldId id="264" r:id="rId12"/>
-    <p:sldId id="265" r:id="rId13"/>
-    <p:sldId id="266" r:id="rId14"/>
-    <p:sldId id="267" r:id="rId15"/>
-    <p:sldId id="268" r:id="rId16"/>
-    <p:sldId id="269" r:id="rId17"/>
-    <p:sldId id="270" r:id="rId18"/>
-    <p:sldId id="271" r:id="rId19"/>
-    <p:sldId id="272" r:id="rId20"/>
-    <p:sldId id="278" r:id="rId21"/>
-    <p:sldId id="273" r:id="rId22"/>
-    <p:sldId id="260" r:id="rId23"/>
+    <p:sldId id="276" r:id="rId9"/>
+    <p:sldId id="263" r:id="rId10"/>
+    <p:sldId id="264" r:id="rId11"/>
+    <p:sldId id="265" r:id="rId12"/>
+    <p:sldId id="266" r:id="rId13"/>
+    <p:sldId id="267" r:id="rId14"/>
+    <p:sldId id="268" r:id="rId15"/>
+    <p:sldId id="269" r:id="rId16"/>
+    <p:sldId id="270" r:id="rId17"/>
+    <p:sldId id="271" r:id="rId18"/>
+    <p:sldId id="272" r:id="rId19"/>
+    <p:sldId id="278" r:id="rId20"/>
+    <p:sldId id="273" r:id="rId21"/>
+    <p:sldId id="260" r:id="rId22"/>
   </p:sldIdLst>
   <p:sldSz cx="12192000" cy="6858000"/>
   <p:notesSz cx="6858000" cy="9144000"/>
   <p:embeddedFontLst>
     <p:embeddedFont>
       <p:font typeface="Calibri" panose="020F0502020204030204" pitchFamily="34" charset="0"/>
-      <p:regular r:id="rId25"/>
-      <p:bold r:id="rId26"/>
-      <p:italic r:id="rId27"/>
-      <p:boldItalic r:id="rId28"/>
+      <p:regular r:id="rId24"/>
+      <p:bold r:id="rId25"/>
+      <p:italic r:id="rId26"/>
+      <p:boldItalic r:id="rId27"/>
     </p:embeddedFont>
     <p:embeddedFont>
       <p:font typeface="Consolas" panose="020B0609020204030204" pitchFamily="49" charset="0"/>
-      <p:regular r:id="rId29"/>
-      <p:bold r:id="rId30"/>
-      <p:italic r:id="rId31"/>
-      <p:boldItalic r:id="rId32"/>
+      <p:regular r:id="rId28"/>
+      <p:bold r:id="rId29"/>
+      <p:italic r:id="rId30"/>
+      <p:boldItalic r:id="rId31"/>
     </p:embeddedFont>
     <p:embeddedFont>
-      <p:font typeface="Quattrocento Sans" panose="020B0604020202020204" charset="0"/>
-      <p:regular r:id="rId33"/>
-      <p:bold r:id="rId34"/>
-      <p:italic r:id="rId35"/>
-      <p:boldItalic r:id="rId36"/>
+      <p:font typeface="Quattrocento Sans" panose="020B0502050000020003" pitchFamily="34" charset="0"/>
+      <p:regular r:id="rId32"/>
+      <p:bold r:id="rId33"/>
+      <p:italic r:id="rId34"/>
+      <p:boldItalic r:id="rId35"/>
     </p:embeddedFont>
     <p:embeddedFont>
       <p:font typeface="Verdana" panose="020B0604030504040204" pitchFamily="34" charset="0"/>
-      <p:regular r:id="rId37"/>
-      <p:bold r:id="rId38"/>
-      <p:italic r:id="rId39"/>
-      <p:boldItalic r:id="rId40"/>
+      <p:regular r:id="rId36"/>
+      <p:bold r:id="rId37"/>
+      <p:italic r:id="rId38"/>
+      <p:boldItalic r:id="rId39"/>
     </p:embeddedFont>
   </p:embeddedFontLst>
   <p:defaultTextStyle>
@@ -2217,110 +2216,6 @@
   <p:cSld>
     <p:spTree>
       <p:nvGrpSpPr>
-        <p:cNvPr id="1" name="Shape 100"/>
-        <p:cNvGrpSpPr/>
-        <p:nvPr/>
-      </p:nvGrpSpPr>
-      <p:grpSpPr>
-        <a:xfrm>
-          <a:off x="0" y="0"/>
-          <a:ext cx="0" cy="0"/>
-          <a:chOff x="0" y="0"/>
-          <a:chExt cx="0" cy="0"/>
-        </a:xfrm>
-      </p:grpSpPr>
-      <p:sp>
-        <p:nvSpPr>
-          <p:cNvPr id="101" name="Google Shape;101;p6:notes"/>
-          <p:cNvSpPr txBox="1">
-            <a:spLocks noGrp="1"/>
-          </p:cNvSpPr>
-          <p:nvPr>
-            <p:ph type="body" idx="1"/>
-          </p:nvPr>
-        </p:nvSpPr>
-        <p:spPr>
-          <a:xfrm>
-            <a:off x="685800" y="4400550"/>
-            <a:ext cx="5486400" cy="3600450"/>
-          </a:xfrm>
-          <a:prstGeom prst="rect">
-            <a:avLst/>
-          </a:prstGeom>
-        </p:spPr>
-        <p:txBody>
-          <a:bodyPr spcFirstLastPara="1" wrap="square" lIns="91425" tIns="45700" rIns="91425" bIns="45700" anchor="t" anchorCtr="0">
-            <a:noAutofit/>
-          </a:bodyPr>
-          <a:lstStyle/>
-          <a:p>
-            <a:pPr marL="0" lvl="0" indent="0" algn="l" rtl="0">
-              <a:spcBef>
-                <a:spcPts val="0"/>
-              </a:spcBef>
-              <a:spcAft>
-                <a:spcPts val="0"/>
-              </a:spcAft>
-              <a:buNone/>
-            </a:pPr>
-            <a:endParaRPr/>
-          </a:p>
-        </p:txBody>
-      </p:sp>
-      <p:sp>
-        <p:nvSpPr>
-          <p:cNvPr id="102" name="Google Shape;102;p6:notes"/>
-          <p:cNvSpPr>
-            <a:spLocks noGrp="1" noRot="1" noChangeAspect="1"/>
-          </p:cNvSpPr>
-          <p:nvPr>
-            <p:ph type="sldImg" idx="2"/>
-          </p:nvPr>
-        </p:nvSpPr>
-        <p:spPr>
-          <a:xfrm>
-            <a:off x="685800" y="1143000"/>
-            <a:ext cx="5486400" cy="3086100"/>
-          </a:xfrm>
-          <a:custGeom>
-            <a:avLst/>
-            <a:gdLst/>
-            <a:ahLst/>
-            <a:cxnLst/>
-            <a:rect l="l" t="t" r="r" b="b"/>
-            <a:pathLst>
-              <a:path w="120000" h="120000" extrusionOk="0">
-                <a:moveTo>
-                  <a:pt x="0" y="0"/>
-                </a:moveTo>
-                <a:lnTo>
-                  <a:pt x="120000" y="0"/>
-                </a:lnTo>
-                <a:lnTo>
-                  <a:pt x="120000" y="120000"/>
-                </a:lnTo>
-                <a:lnTo>
-                  <a:pt x="0" y="120000"/>
-                </a:lnTo>
-                <a:close/>
-              </a:path>
-            </a:pathLst>
-          </a:custGeom>
-        </p:spPr>
-      </p:sp>
-    </p:spTree>
-  </p:cSld>
-  <p:clrMapOvr>
-    <a:masterClrMapping/>
-  </p:clrMapOvr>
-</p:notes>
-</file>
-
-<file path=ppt/notesSlides/notesSlide11.xml><?xml version="1.0" encoding="utf-8"?>
-<p:notes xmlns:a="http://schemas.openxmlformats.org/drawingml/2006/main" xmlns:r="http://schemas.openxmlformats.org/officeDocument/2006/relationships" xmlns:p="http://schemas.openxmlformats.org/presentationml/2006/main" showMasterSp="0" showMasterPhAnim="0">
-  <p:cSld>
-    <p:spTree>
-      <p:nvGrpSpPr>
         <p:cNvPr id="1" name="Shape 107"/>
         <p:cNvGrpSpPr/>
         <p:nvPr/>
@@ -2420,7 +2315,7 @@
 </p:notes>
 </file>
 
-<file path=ppt/notesSlides/notesSlide12.xml><?xml version="1.0" encoding="utf-8"?>
+<file path=ppt/notesSlides/notesSlide11.xml><?xml version="1.0" encoding="utf-8"?>
 <p:notes xmlns:a="http://schemas.openxmlformats.org/drawingml/2006/main" xmlns:r="http://schemas.openxmlformats.org/officeDocument/2006/relationships" xmlns:p="http://schemas.openxmlformats.org/presentationml/2006/main" showMasterSp="0" showMasterPhAnim="0">
   <p:cSld>
     <p:spTree>
@@ -2524,7 +2419,7 @@
 </p:notes>
 </file>
 
-<file path=ppt/notesSlides/notesSlide13.xml><?xml version="1.0" encoding="utf-8"?>
+<file path=ppt/notesSlides/notesSlide12.xml><?xml version="1.0" encoding="utf-8"?>
 <p:notes xmlns:a="http://schemas.openxmlformats.org/drawingml/2006/main" xmlns:r="http://schemas.openxmlformats.org/officeDocument/2006/relationships" xmlns:p="http://schemas.openxmlformats.org/presentationml/2006/main" showMasterSp="0" showMasterPhAnim="0">
   <p:cSld>
     <p:spTree>
@@ -2628,7 +2523,7 @@
 </p:notes>
 </file>
 
-<file path=ppt/notesSlides/notesSlide14.xml><?xml version="1.0" encoding="utf-8"?>
+<file path=ppt/notesSlides/notesSlide13.xml><?xml version="1.0" encoding="utf-8"?>
 <p:notes xmlns:a="http://schemas.openxmlformats.org/drawingml/2006/main" xmlns:r="http://schemas.openxmlformats.org/officeDocument/2006/relationships" xmlns:p="http://schemas.openxmlformats.org/presentationml/2006/main" showMasterSp="0" showMasterPhAnim="0">
   <p:cSld>
     <p:spTree>
@@ -2732,7 +2627,7 @@
 </p:notes>
 </file>
 
-<file path=ppt/notesSlides/notesSlide15.xml><?xml version="1.0" encoding="utf-8"?>
+<file path=ppt/notesSlides/notesSlide14.xml><?xml version="1.0" encoding="utf-8"?>
 <p:notes xmlns:a="http://schemas.openxmlformats.org/drawingml/2006/main" xmlns:r="http://schemas.openxmlformats.org/officeDocument/2006/relationships" xmlns:p="http://schemas.openxmlformats.org/presentationml/2006/main" showMasterSp="0" showMasterPhAnim="0">
   <p:cSld>
     <p:spTree>
@@ -2836,7 +2731,7 @@
 </p:notes>
 </file>
 
-<file path=ppt/notesSlides/notesSlide16.xml><?xml version="1.0" encoding="utf-8"?>
+<file path=ppt/notesSlides/notesSlide15.xml><?xml version="1.0" encoding="utf-8"?>
 <p:notes xmlns:a="http://schemas.openxmlformats.org/drawingml/2006/main" xmlns:r="http://schemas.openxmlformats.org/officeDocument/2006/relationships" xmlns:p="http://schemas.openxmlformats.org/presentationml/2006/main" showMasterSp="0" showMasterPhAnim="0">
   <p:cSld>
     <p:spTree>
@@ -2940,7 +2835,7 @@
 </p:notes>
 </file>
 
-<file path=ppt/notesSlides/notesSlide17.xml><?xml version="1.0" encoding="utf-8"?>
+<file path=ppt/notesSlides/notesSlide16.xml><?xml version="1.0" encoding="utf-8"?>
 <p:notes xmlns:a="http://schemas.openxmlformats.org/drawingml/2006/main" xmlns:r="http://schemas.openxmlformats.org/officeDocument/2006/relationships" xmlns:p="http://schemas.openxmlformats.org/presentationml/2006/main" showMasterSp="0" showMasterPhAnim="0">
   <p:cSld>
     <p:spTree>
@@ -3044,7 +2939,7 @@
 </p:notes>
 </file>
 
-<file path=ppt/notesSlides/notesSlide18.xml><?xml version="1.0" encoding="utf-8"?>
+<file path=ppt/notesSlides/notesSlide17.xml><?xml version="1.0" encoding="utf-8"?>
 <p:notes xmlns:a="http://schemas.openxmlformats.org/drawingml/2006/main" xmlns:r="http://schemas.openxmlformats.org/officeDocument/2006/relationships" xmlns:p="http://schemas.openxmlformats.org/presentationml/2006/main" showMasterSp="0" showMasterPhAnim="0">
   <p:cSld>
     <p:spTree>
@@ -3102,6 +2997,110 @@
       <p:sp>
         <p:nvSpPr>
           <p:cNvPr id="168" name="Google Shape;168;p14:notes"/>
+          <p:cNvSpPr>
+            <a:spLocks noGrp="1" noRot="1" noChangeAspect="1"/>
+          </p:cNvSpPr>
+          <p:nvPr>
+            <p:ph type="sldImg" idx="2"/>
+          </p:nvPr>
+        </p:nvSpPr>
+        <p:spPr>
+          <a:xfrm>
+            <a:off x="685800" y="1143000"/>
+            <a:ext cx="5486400" cy="3086100"/>
+          </a:xfrm>
+          <a:custGeom>
+            <a:avLst/>
+            <a:gdLst/>
+            <a:ahLst/>
+            <a:cxnLst/>
+            <a:rect l="l" t="t" r="r" b="b"/>
+            <a:pathLst>
+              <a:path w="120000" h="120000" extrusionOk="0">
+                <a:moveTo>
+                  <a:pt x="0" y="0"/>
+                </a:moveTo>
+                <a:lnTo>
+                  <a:pt x="120000" y="0"/>
+                </a:lnTo>
+                <a:lnTo>
+                  <a:pt x="120000" y="120000"/>
+                </a:lnTo>
+                <a:lnTo>
+                  <a:pt x="0" y="120000"/>
+                </a:lnTo>
+                <a:close/>
+              </a:path>
+            </a:pathLst>
+          </a:custGeom>
+        </p:spPr>
+      </p:sp>
+    </p:spTree>
+  </p:cSld>
+  <p:clrMapOvr>
+    <a:masterClrMapping/>
+  </p:clrMapOvr>
+</p:notes>
+</file>
+
+<file path=ppt/notesSlides/notesSlide18.xml><?xml version="1.0" encoding="utf-8"?>
+<p:notes xmlns:a="http://schemas.openxmlformats.org/drawingml/2006/main" xmlns:r="http://schemas.openxmlformats.org/officeDocument/2006/relationships" xmlns:p="http://schemas.openxmlformats.org/presentationml/2006/main" showMasterSp="0" showMasterPhAnim="0">
+  <p:cSld>
+    <p:spTree>
+      <p:nvGrpSpPr>
+        <p:cNvPr id="1" name="Shape 173"/>
+        <p:cNvGrpSpPr/>
+        <p:nvPr/>
+      </p:nvGrpSpPr>
+      <p:grpSpPr>
+        <a:xfrm>
+          <a:off x="0" y="0"/>
+          <a:ext cx="0" cy="0"/>
+          <a:chOff x="0" y="0"/>
+          <a:chExt cx="0" cy="0"/>
+        </a:xfrm>
+      </p:grpSpPr>
+      <p:sp>
+        <p:nvSpPr>
+          <p:cNvPr id="174" name="Google Shape;174;p15:notes"/>
+          <p:cNvSpPr txBox="1">
+            <a:spLocks noGrp="1"/>
+          </p:cNvSpPr>
+          <p:nvPr>
+            <p:ph type="body" idx="1"/>
+          </p:nvPr>
+        </p:nvSpPr>
+        <p:spPr>
+          <a:xfrm>
+            <a:off x="685800" y="4400550"/>
+            <a:ext cx="5486400" cy="3600450"/>
+          </a:xfrm>
+          <a:prstGeom prst="rect">
+            <a:avLst/>
+          </a:prstGeom>
+        </p:spPr>
+        <p:txBody>
+          <a:bodyPr spcFirstLastPara="1" wrap="square" lIns="91425" tIns="45700" rIns="91425" bIns="45700" anchor="t" anchorCtr="0">
+            <a:noAutofit/>
+          </a:bodyPr>
+          <a:lstStyle/>
+          <a:p>
+            <a:pPr marL="0" lvl="0" indent="0" algn="l" rtl="0">
+              <a:spcBef>
+                <a:spcPts val="0"/>
+              </a:spcBef>
+              <a:spcAft>
+                <a:spcPts val="0"/>
+              </a:spcAft>
+              <a:buNone/>
+            </a:pPr>
+            <a:endParaRPr/>
+          </a:p>
+        </p:txBody>
+      </p:sp>
+      <p:sp>
+        <p:nvSpPr>
+          <p:cNvPr id="175" name="Google Shape;175;p15:notes"/>
           <p:cNvSpPr>
             <a:spLocks noGrp="1" noRot="1" noChangeAspect="1"/>
           </p:cNvSpPr>
@@ -3245,6 +3244,11 @@
         </p:spPr>
       </p:sp>
     </p:spTree>
+    <p:extLst>
+      <p:ext uri="{BB962C8B-B14F-4D97-AF65-F5344CB8AC3E}">
+        <p14:creationId xmlns:p14="http://schemas.microsoft.com/office/powerpoint/2010/main" val="688375983"/>
+      </p:ext>
+    </p:extLst>
   </p:cSld>
   <p:clrMapOvr>
     <a:masterClrMapping/>
@@ -3375,115 +3379,6 @@
 </file>
 
 <file path=ppt/notesSlides/notesSlide20.xml><?xml version="1.0" encoding="utf-8"?>
-<p:notes xmlns:a="http://schemas.openxmlformats.org/drawingml/2006/main" xmlns:r="http://schemas.openxmlformats.org/officeDocument/2006/relationships" xmlns:p="http://schemas.openxmlformats.org/presentationml/2006/main" showMasterSp="0" showMasterPhAnim="0">
-  <p:cSld>
-    <p:spTree>
-      <p:nvGrpSpPr>
-        <p:cNvPr id="1" name="Shape 173"/>
-        <p:cNvGrpSpPr/>
-        <p:nvPr/>
-      </p:nvGrpSpPr>
-      <p:grpSpPr>
-        <a:xfrm>
-          <a:off x="0" y="0"/>
-          <a:ext cx="0" cy="0"/>
-          <a:chOff x="0" y="0"/>
-          <a:chExt cx="0" cy="0"/>
-        </a:xfrm>
-      </p:grpSpPr>
-      <p:sp>
-        <p:nvSpPr>
-          <p:cNvPr id="174" name="Google Shape;174;p15:notes"/>
-          <p:cNvSpPr txBox="1">
-            <a:spLocks noGrp="1"/>
-          </p:cNvSpPr>
-          <p:nvPr>
-            <p:ph type="body" idx="1"/>
-          </p:nvPr>
-        </p:nvSpPr>
-        <p:spPr>
-          <a:xfrm>
-            <a:off x="685800" y="4400550"/>
-            <a:ext cx="5486400" cy="3600450"/>
-          </a:xfrm>
-          <a:prstGeom prst="rect">
-            <a:avLst/>
-          </a:prstGeom>
-        </p:spPr>
-        <p:txBody>
-          <a:bodyPr spcFirstLastPara="1" wrap="square" lIns="91425" tIns="45700" rIns="91425" bIns="45700" anchor="t" anchorCtr="0">
-            <a:noAutofit/>
-          </a:bodyPr>
-          <a:lstStyle/>
-          <a:p>
-            <a:pPr marL="0" lvl="0" indent="0" algn="l" rtl="0">
-              <a:spcBef>
-                <a:spcPts val="0"/>
-              </a:spcBef>
-              <a:spcAft>
-                <a:spcPts val="0"/>
-              </a:spcAft>
-              <a:buNone/>
-            </a:pPr>
-            <a:endParaRPr/>
-          </a:p>
-        </p:txBody>
-      </p:sp>
-      <p:sp>
-        <p:nvSpPr>
-          <p:cNvPr id="175" name="Google Shape;175;p15:notes"/>
-          <p:cNvSpPr>
-            <a:spLocks noGrp="1" noRot="1" noChangeAspect="1"/>
-          </p:cNvSpPr>
-          <p:nvPr>
-            <p:ph type="sldImg" idx="2"/>
-          </p:nvPr>
-        </p:nvSpPr>
-        <p:spPr>
-          <a:xfrm>
-            <a:off x="685800" y="1143000"/>
-            <a:ext cx="5486400" cy="3086100"/>
-          </a:xfrm>
-          <a:custGeom>
-            <a:avLst/>
-            <a:gdLst/>
-            <a:ahLst/>
-            <a:cxnLst/>
-            <a:rect l="l" t="t" r="r" b="b"/>
-            <a:pathLst>
-              <a:path w="120000" h="120000" extrusionOk="0">
-                <a:moveTo>
-                  <a:pt x="0" y="0"/>
-                </a:moveTo>
-                <a:lnTo>
-                  <a:pt x="120000" y="0"/>
-                </a:lnTo>
-                <a:lnTo>
-                  <a:pt x="120000" y="120000"/>
-                </a:lnTo>
-                <a:lnTo>
-                  <a:pt x="0" y="120000"/>
-                </a:lnTo>
-                <a:close/>
-              </a:path>
-            </a:pathLst>
-          </a:custGeom>
-        </p:spPr>
-      </p:sp>
-    </p:spTree>
-    <p:extLst>
-      <p:ext uri="{BB962C8B-B14F-4D97-AF65-F5344CB8AC3E}">
-        <p14:creationId xmlns:p14="http://schemas.microsoft.com/office/powerpoint/2010/main" val="688375983"/>
-      </p:ext>
-    </p:extLst>
-  </p:cSld>
-  <p:clrMapOvr>
-    <a:masterClrMapping/>
-  </p:clrMapOvr>
-</p:notes>
-</file>
-
-<file path=ppt/notesSlides/notesSlide21.xml><?xml version="1.0" encoding="utf-8"?>
 <p:notes xmlns:a="http://schemas.openxmlformats.org/drawingml/2006/main" xmlns:r="http://schemas.openxmlformats.org/officeDocument/2006/relationships" xmlns:p="http://schemas.openxmlformats.org/presentationml/2006/main" showMasterSp="0" showMasterPhAnim="0">
   <p:cSld>
     <p:spTree>
@@ -3641,7 +3536,7 @@
             </a:pPr>
             <a:fld id="{00000000-1234-1234-1234-123412341234}" type="slidenum">
               <a:rPr lang="en-US"/>
-              <a:t>22</a:t>
+              <a:t>21</a:t>
             </a:fld>
             <a:endParaRPr/>
           </a:p>
@@ -4208,7 +4103,7 @@
   <p:cSld>
     <p:spTree>
       <p:nvGrpSpPr>
-        <p:cNvPr id="1" name="Shape 93"/>
+        <p:cNvPr id="1" name="Shape 100"/>
         <p:cNvGrpSpPr/>
         <p:nvPr/>
       </p:nvGrpSpPr>
@@ -4222,7 +4117,7 @@
       </p:grpSpPr>
       <p:sp>
         <p:nvSpPr>
-          <p:cNvPr id="94" name="Google Shape;94;p5:notes"/>
+          <p:cNvPr id="101" name="Google Shape;101;p6:notes"/>
           <p:cNvSpPr txBox="1">
             <a:spLocks noGrp="1"/>
           </p:cNvSpPr>
@@ -4260,7 +4155,7 @@
       </p:sp>
       <p:sp>
         <p:nvSpPr>
-          <p:cNvPr id="95" name="Google Shape;95;p5:notes"/>
+          <p:cNvPr id="102" name="Google Shape;102;p6:notes"/>
           <p:cNvSpPr>
             <a:spLocks noGrp="1" noRot="1" noChangeAspect="1"/>
           </p:cNvSpPr>
@@ -4302,7 +4197,7 @@
     </p:spTree>
     <p:extLst>
       <p:ext uri="{BB962C8B-B14F-4D97-AF65-F5344CB8AC3E}">
-        <p14:creationId xmlns:p14="http://schemas.microsoft.com/office/powerpoint/2010/main" val="2507327170"/>
+        <p14:creationId xmlns:p14="http://schemas.microsoft.com/office/powerpoint/2010/main" val="73351437"/>
       </p:ext>
     </p:extLst>
   </p:cSld>
@@ -4409,11 +4304,6 @@
         </p:spPr>
       </p:sp>
     </p:spTree>
-    <p:extLst>
-      <p:ext uri="{BB962C8B-B14F-4D97-AF65-F5344CB8AC3E}">
-        <p14:creationId xmlns:p14="http://schemas.microsoft.com/office/powerpoint/2010/main" val="73351437"/>
-      </p:ext>
-    </p:extLst>
   </p:cSld>
   <p:clrMapOvr>
     <a:masterClrMapping/>
@@ -13753,330 +13643,6 @@
   <p:cSld>
     <p:spTree>
       <p:nvGrpSpPr>
-        <p:cNvPr id="1" name="Shape 103"/>
-        <p:cNvGrpSpPr/>
-        <p:nvPr/>
-      </p:nvGrpSpPr>
-      <p:grpSpPr>
-        <a:xfrm>
-          <a:off x="0" y="0"/>
-          <a:ext cx="0" cy="0"/>
-          <a:chOff x="0" y="0"/>
-          <a:chExt cx="0" cy="0"/>
-        </a:xfrm>
-      </p:grpSpPr>
-      <p:sp>
-        <p:nvSpPr>
-          <p:cNvPr id="104" name="Google Shape;104;p6"/>
-          <p:cNvSpPr txBox="1">
-            <a:spLocks noGrp="1"/>
-          </p:cNvSpPr>
-          <p:nvPr>
-            <p:ph type="title"/>
-          </p:nvPr>
-        </p:nvSpPr>
-        <p:spPr>
-          <a:xfrm>
-            <a:off x="749423" y="191143"/>
-            <a:ext cx="10515600" cy="1325563"/>
-          </a:xfrm>
-          <a:prstGeom prst="rect">
-            <a:avLst/>
-          </a:prstGeom>
-          <a:noFill/>
-          <a:ln>
-            <a:noFill/>
-          </a:ln>
-        </p:spPr>
-        <p:txBody>
-          <a:bodyPr spcFirstLastPara="1" wrap="square" lIns="91425" tIns="45700" rIns="91425" bIns="45700" anchor="ctr" anchorCtr="0">
-            <a:normAutofit/>
-          </a:bodyPr>
-          <a:lstStyle/>
-          <a:p>
-            <a:pPr marL="0" lvl="0" indent="0" algn="l" rtl="0">
-              <a:lnSpc>
-                <a:spcPct val="90000"/>
-              </a:lnSpc>
-              <a:spcBef>
-                <a:spcPts val="0"/>
-              </a:spcBef>
-              <a:spcAft>
-                <a:spcPts val="0"/>
-              </a:spcAft>
-              <a:buClr>
-                <a:schemeClr val="dk1"/>
-              </a:buClr>
-              <a:buSzPts val="4000"/>
-              <a:buFont typeface="Consolas"/>
-              <a:buNone/>
-            </a:pPr>
-            <a:r>
-              <a:rPr lang="en-CA" sz="4000"/>
-              <a:t>PCA: base r function “prcomp”</a:t>
-            </a:r>
-            <a:endParaRPr/>
-          </a:p>
-        </p:txBody>
-      </p:sp>
-      <p:sp>
-        <p:nvSpPr>
-          <p:cNvPr id="106" name="Google Shape;106;p6"/>
-          <p:cNvSpPr txBox="1"/>
-          <p:nvPr/>
-        </p:nvSpPr>
-        <p:spPr>
-          <a:xfrm>
-            <a:off x="542925" y="6076950"/>
-            <a:ext cx="8476788" cy="369332"/>
-          </a:xfrm>
-          <a:prstGeom prst="rect">
-            <a:avLst/>
-          </a:prstGeom>
-          <a:noFill/>
-          <a:ln>
-            <a:noFill/>
-          </a:ln>
-        </p:spPr>
-        <p:txBody>
-          <a:bodyPr spcFirstLastPara="1" wrap="square" lIns="91425" tIns="45700" rIns="91425" bIns="45700" anchor="t" anchorCtr="0">
-            <a:spAutoFit/>
-          </a:bodyPr>
-          <a:lstStyle/>
-          <a:p>
-            <a:pPr marL="0" marR="0" lvl="0" indent="0" algn="l" rtl="0">
-              <a:spcBef>
-                <a:spcPts val="0"/>
-              </a:spcBef>
-              <a:spcAft>
-                <a:spcPts val="0"/>
-              </a:spcAft>
-              <a:buNone/>
-            </a:pPr>
-            <a:r>
-              <a:rPr lang="en-CA" sz="1800">
-                <a:solidFill>
-                  <a:schemeClr val="dk1"/>
-                </a:solidFill>
-                <a:latin typeface="Verdana"/>
-                <a:ea typeface="Verdana"/>
-                <a:cs typeface="Verdana"/>
-                <a:sym typeface="Verdana"/>
-              </a:rPr>
-              <a:t>A useful PCA paper: </a:t>
-            </a:r>
-            <a:r>
-              <a:rPr lang="en-CA" sz="1800" u="sng">
-                <a:solidFill>
-                  <a:schemeClr val="dk1"/>
-                </a:solidFill>
-                <a:latin typeface="Verdana"/>
-                <a:ea typeface="Verdana"/>
-                <a:cs typeface="Verdana"/>
-                <a:sym typeface="Verdana"/>
-                <a:hlinkClick r:id="rId3"/>
-              </a:rPr>
-              <a:t>https://www.cs.cmu.edu/~elaw/papers/pca.pdf</a:t>
-            </a:r>
-            <a:endParaRPr sz="1800">
-              <a:solidFill>
-                <a:schemeClr val="dk1"/>
-              </a:solidFill>
-              <a:latin typeface="Verdana"/>
-              <a:ea typeface="Verdana"/>
-              <a:cs typeface="Verdana"/>
-              <a:sym typeface="Verdana"/>
-            </a:endParaRPr>
-          </a:p>
-        </p:txBody>
-      </p:sp>
-      <p:sp>
-        <p:nvSpPr>
-          <p:cNvPr id="105" name="Google Shape;105;p6"/>
-          <p:cNvSpPr txBox="1">
-            <a:spLocks noGrp="1"/>
-          </p:cNvSpPr>
-          <p:nvPr>
-            <p:ph type="body" idx="1"/>
-          </p:nvPr>
-        </p:nvSpPr>
-        <p:spPr>
-          <a:xfrm>
-            <a:off x="3352800" y="2266006"/>
-            <a:ext cx="3536950" cy="427038"/>
-          </a:xfrm>
-          <a:prstGeom prst="rect">
-            <a:avLst/>
-          </a:prstGeom>
-          <a:noFill/>
-          <a:ln>
-            <a:noFill/>
-          </a:ln>
-        </p:spPr>
-        <p:txBody>
-          <a:bodyPr spcFirstLastPara="1" wrap="square" lIns="91425" tIns="45700" rIns="91425" bIns="45700" anchor="t" anchorCtr="0">
-            <a:normAutofit lnSpcReduction="10000"/>
-          </a:bodyPr>
-          <a:lstStyle/>
-          <a:p>
-            <a:pPr marL="0" indent="0">
-              <a:lnSpc>
-                <a:spcPct val="80000"/>
-              </a:lnSpc>
-              <a:spcBef>
-                <a:spcPts val="0"/>
-              </a:spcBef>
-              <a:buSzPts val="2800"/>
-              <a:buNone/>
-            </a:pPr>
-            <a:r>
-              <a:rPr lang="en-CA" sz="2800"/>
-              <a:t>Switch to exercise</a:t>
-            </a:r>
-            <a:endParaRPr lang="en-US" sz="2800"/>
-          </a:p>
-        </p:txBody>
-      </p:sp>
-    </p:spTree>
-  </p:cSld>
-  <p:clrMapOvr>
-    <a:masterClrMapping/>
-  </p:clrMapOvr>
-  <p:timing>
-    <p:tnLst>
-      <p:par>
-        <p:cTn id="1" dur="indefinite" restart="never" nodeType="tmRoot">
-          <p:childTnLst>
-            <p:seq concurrent="1" nextAc="seek">
-              <p:cTn id="2" dur="indefinite" nodeType="mainSeq">
-                <p:childTnLst>
-                  <p:par>
-                    <p:cTn id="3" fill="hold">
-                      <p:stCondLst>
-                        <p:cond delay="indefinite"/>
-                      </p:stCondLst>
-                      <p:childTnLst>
-                        <p:par>
-                          <p:cTn id="4" fill="hold">
-                            <p:stCondLst>
-                              <p:cond delay="0"/>
-                            </p:stCondLst>
-                            <p:childTnLst>
-                              <p:par>
-                                <p:cTn id="5" presetID="1" presetClass="entr" presetSubtype="0" fill="hold" nodeType="clickEffect">
-                                  <p:stCondLst>
-                                    <p:cond delay="0"/>
-                                  </p:stCondLst>
-                                  <p:childTnLst>
-                                    <p:set>
-                                      <p:cBhvr>
-                                        <p:cTn id="6" dur="1" fill="hold">
-                                          <p:stCondLst>
-                                            <p:cond delay="0"/>
-                                          </p:stCondLst>
-                                        </p:cTn>
-                                        <p:tgtEl>
-                                          <p:spTgt spid="105">
-                                            <p:txEl>
-                                              <p:pRg st="0" end="0"/>
-                                            </p:txEl>
-                                          </p:spTgt>
-                                        </p:tgtEl>
-                                        <p:attrNameLst>
-                                          <p:attrName>style.visibility</p:attrName>
-                                        </p:attrNameLst>
-                                      </p:cBhvr>
-                                      <p:to>
-                                        <p:strVal val="visible"/>
-                                      </p:to>
-                                    </p:set>
-                                  </p:childTnLst>
-                                </p:cTn>
-                              </p:par>
-                            </p:childTnLst>
-                          </p:cTn>
-                        </p:par>
-                      </p:childTnLst>
-                    </p:cTn>
-                  </p:par>
-                  <p:par>
-                    <p:cTn id="7" fill="hold">
-                      <p:stCondLst>
-                        <p:cond delay="indefinite"/>
-                      </p:stCondLst>
-                      <p:childTnLst>
-                        <p:par>
-                          <p:cTn id="8" fill="hold">
-                            <p:stCondLst>
-                              <p:cond delay="0"/>
-                            </p:stCondLst>
-                            <p:childTnLst>
-                              <p:par>
-                                <p:cTn id="9" presetID="1" presetClass="entr" presetSubtype="0" fill="hold" grpId="0" nodeType="clickEffect">
-                                  <p:stCondLst>
-                                    <p:cond delay="0"/>
-                                  </p:stCondLst>
-                                  <p:childTnLst>
-                                    <p:set>
-                                      <p:cBhvr>
-                                        <p:cTn id="10" dur="1" fill="hold">
-                                          <p:stCondLst>
-                                            <p:cond delay="0"/>
-                                          </p:stCondLst>
-                                        </p:cTn>
-                                        <p:tgtEl>
-                                          <p:spTgt spid="106"/>
-                                        </p:tgtEl>
-                                        <p:attrNameLst>
-                                          <p:attrName>style.visibility</p:attrName>
-                                        </p:attrNameLst>
-                                      </p:cBhvr>
-                                      <p:to>
-                                        <p:strVal val="visible"/>
-                                      </p:to>
-                                    </p:set>
-                                  </p:childTnLst>
-                                </p:cTn>
-                              </p:par>
-                            </p:childTnLst>
-                          </p:cTn>
-                        </p:par>
-                      </p:childTnLst>
-                    </p:cTn>
-                  </p:par>
-                </p:childTnLst>
-              </p:cTn>
-              <p:prevCondLst>
-                <p:cond evt="onPrev" delay="0">
-                  <p:tgtEl>
-                    <p:sldTgt/>
-                  </p:tgtEl>
-                </p:cond>
-              </p:prevCondLst>
-              <p:nextCondLst>
-                <p:cond evt="onNext" delay="0">
-                  <p:tgtEl>
-                    <p:sldTgt/>
-                  </p:tgtEl>
-                </p:cond>
-              </p:nextCondLst>
-            </p:seq>
-          </p:childTnLst>
-        </p:cTn>
-      </p:par>
-    </p:tnLst>
-    <p:bldLst>
-      <p:bldP spid="106" grpId="0"/>
-    </p:bldLst>
-  </p:timing>
-</p:sld>
-</file>
-
-<file path=ppt/slides/slide11.xml><?xml version="1.0" encoding="utf-8"?>
-<p:sld xmlns:a="http://schemas.openxmlformats.org/drawingml/2006/main" xmlns:r="http://schemas.openxmlformats.org/officeDocument/2006/relationships" xmlns:p="http://schemas.openxmlformats.org/presentationml/2006/main">
-  <p:cSld>
-    <p:spTree>
-      <p:nvGrpSpPr>
         <p:cNvPr id="1" name="Shape 110"/>
         <p:cNvGrpSpPr/>
         <p:nvPr/>
@@ -14424,39 +13990,6 @@
           </a:p>
         </p:txBody>
       </p:sp>
-      <p:pic>
-        <p:nvPicPr>
-          <p:cNvPr id="8" name="Google Shape;125;p8">
-            <a:extLst>
-              <a:ext uri="{FF2B5EF4-FFF2-40B4-BE49-F238E27FC236}">
-                <a16:creationId xmlns:a16="http://schemas.microsoft.com/office/drawing/2014/main" id="{302B9476-A450-4BC8-8F69-8FFB23CA7354}"/>
-              </a:ext>
-            </a:extLst>
-          </p:cNvPr>
-          <p:cNvPicPr preferRelativeResize="0"/>
-          <p:nvPr/>
-        </p:nvPicPr>
-        <p:blipFill rotWithShape="1">
-          <a:blip r:embed="rId5">
-            <a:alphaModFix/>
-          </a:blip>
-          <a:srcRect/>
-          <a:stretch/>
-        </p:blipFill>
-        <p:spPr>
-          <a:xfrm>
-            <a:off x="10102001" y="784473"/>
-            <a:ext cx="1438275" cy="790575"/>
-          </a:xfrm>
-          <a:prstGeom prst="rect">
-            <a:avLst/>
-          </a:prstGeom>
-          <a:noFill/>
-          <a:ln>
-            <a:noFill/>
-          </a:ln>
-        </p:spPr>
-      </p:pic>
     </p:spTree>
   </p:cSld>
   <p:clrMapOvr>
@@ -14699,51 +14232,6 @@
                       </p:childTnLst>
                     </p:cTn>
                   </p:par>
-                  <p:par>
-                    <p:cTn id="23" fill="hold">
-                      <p:stCondLst>
-                        <p:cond delay="indefinite"/>
-                      </p:stCondLst>
-                      <p:childTnLst>
-                        <p:par>
-                          <p:cTn id="24" fill="hold">
-                            <p:stCondLst>
-                              <p:cond delay="0"/>
-                            </p:stCondLst>
-                            <p:childTnLst>
-                              <p:par>
-                                <p:cTn id="25" presetID="1" presetClass="entr" presetSubtype="0" fill="hold" nodeType="clickEffect">
-                                  <p:stCondLst>
-                                    <p:cond delay="0"/>
-                                  </p:stCondLst>
-                                  <p:childTnLst>
-                                    <p:set>
-                                      <p:cBhvr>
-                                        <p:cTn id="26" dur="1" fill="hold">
-                                          <p:stCondLst>
-                                            <p:cond delay="0"/>
-                                          </p:stCondLst>
-                                        </p:cTn>
-                                        <p:tgtEl>
-                                          <p:spTgt spid="8"/>
-                                        </p:tgtEl>
-                                        <p:attrNameLst>
-                                          <p:attrName>style.visibility</p:attrName>
-                                        </p:attrNameLst>
-                                      </p:cBhvr>
-                                      <p:to>
-                                        <p:strVal val="visible"/>
-                                      </p:to>
-                                    </p:set>
-                                  </p:childTnLst>
-                                </p:cTn>
-                              </p:par>
-                            </p:childTnLst>
-                          </p:cTn>
-                        </p:par>
-                      </p:childTnLst>
-                    </p:cTn>
-                  </p:par>
                 </p:childTnLst>
               </p:cTn>
               <p:prevCondLst>
@@ -14772,7 +14260,7 @@
 </p:sld>
 </file>
 
-<file path=ppt/slides/slide12.xml><?xml version="1.0" encoding="utf-8"?>
+<file path=ppt/slides/slide11.xml><?xml version="1.0" encoding="utf-8"?>
 <p:sld xmlns:a="http://schemas.openxmlformats.org/drawingml/2006/main" xmlns:r="http://schemas.openxmlformats.org/officeDocument/2006/relationships" xmlns:p="http://schemas.openxmlformats.org/presentationml/2006/main">
   <p:cSld>
     <p:spTree>
@@ -14940,33 +14428,6 @@
           <a:xfrm>
             <a:off x="3768711" y="2913705"/>
             <a:ext cx="3797495" cy="3327571"/>
-          </a:xfrm>
-          <a:prstGeom prst="rect">
-            <a:avLst/>
-          </a:prstGeom>
-          <a:noFill/>
-          <a:ln>
-            <a:noFill/>
-          </a:ln>
-        </p:spPr>
-      </p:pic>
-      <p:pic>
-        <p:nvPicPr>
-          <p:cNvPr id="125" name="Google Shape;125;p8"/>
-          <p:cNvPicPr preferRelativeResize="0"/>
-          <p:nvPr/>
-        </p:nvPicPr>
-        <p:blipFill rotWithShape="1">
-          <a:blip r:embed="rId5">
-            <a:alphaModFix/>
-          </a:blip>
-          <a:srcRect/>
-          <a:stretch/>
-        </p:blipFill>
-        <p:spPr>
-          <a:xfrm>
-            <a:off x="9068195" y="3304445"/>
-            <a:ext cx="1438275" cy="790575"/>
           </a:xfrm>
           <a:prstGeom prst="rect">
             <a:avLst/>
@@ -15129,51 +14590,6 @@
                       </p:childTnLst>
                     </p:cTn>
                   </p:par>
-                  <p:par>
-                    <p:cTn id="15" fill="hold">
-                      <p:stCondLst>
-                        <p:cond delay="indefinite"/>
-                      </p:stCondLst>
-                      <p:childTnLst>
-                        <p:par>
-                          <p:cTn id="16" fill="hold">
-                            <p:stCondLst>
-                              <p:cond delay="0"/>
-                            </p:stCondLst>
-                            <p:childTnLst>
-                              <p:par>
-                                <p:cTn id="17" presetID="1" presetClass="entr" presetSubtype="0" fill="hold" nodeType="clickEffect">
-                                  <p:stCondLst>
-                                    <p:cond delay="0"/>
-                                  </p:stCondLst>
-                                  <p:childTnLst>
-                                    <p:set>
-                                      <p:cBhvr>
-                                        <p:cTn id="18" dur="1" fill="hold">
-                                          <p:stCondLst>
-                                            <p:cond delay="0"/>
-                                          </p:stCondLst>
-                                        </p:cTn>
-                                        <p:tgtEl>
-                                          <p:spTgt spid="125"/>
-                                        </p:tgtEl>
-                                        <p:attrNameLst>
-                                          <p:attrName>style.visibility</p:attrName>
-                                        </p:attrNameLst>
-                                      </p:cBhvr>
-                                      <p:to>
-                                        <p:strVal val="visible"/>
-                                      </p:to>
-                                    </p:set>
-                                  </p:childTnLst>
-                                </p:cTn>
-                              </p:par>
-                            </p:childTnLst>
-                          </p:cTn>
-                        </p:par>
-                      </p:childTnLst>
-                    </p:cTn>
-                  </p:par>
                 </p:childTnLst>
               </p:cTn>
               <p:prevCondLst>
@@ -15199,7 +14615,7 @@
 </p:sld>
 </file>
 
-<file path=ppt/slides/slide13.xml><?xml version="1.0" encoding="utf-8"?>
+<file path=ppt/slides/slide12.xml><?xml version="1.0" encoding="utf-8"?>
 <p:sld xmlns:a="http://schemas.openxmlformats.org/drawingml/2006/main" xmlns:r="http://schemas.openxmlformats.org/officeDocument/2006/relationships" xmlns:p="http://schemas.openxmlformats.org/presentationml/2006/main">
   <p:cSld>
     <p:spTree>
@@ -15299,39 +14715,12 @@
       </p:pic>
       <p:pic>
         <p:nvPicPr>
-          <p:cNvPr id="132" name="Google Shape;132;p9"/>
+          <p:cNvPr id="133" name="Google Shape;133;p9"/>
           <p:cNvPicPr preferRelativeResize="0"/>
           <p:nvPr/>
         </p:nvPicPr>
         <p:blipFill rotWithShape="1">
           <a:blip r:embed="rId4">
-            <a:alphaModFix/>
-          </a:blip>
-          <a:srcRect/>
-          <a:stretch/>
-        </p:blipFill>
-        <p:spPr>
-          <a:xfrm>
-            <a:off x="10029248" y="1813346"/>
-            <a:ext cx="1438275" cy="790575"/>
-          </a:xfrm>
-          <a:prstGeom prst="rect">
-            <a:avLst/>
-          </a:prstGeom>
-          <a:noFill/>
-          <a:ln>
-            <a:noFill/>
-          </a:ln>
-        </p:spPr>
-      </p:pic>
-      <p:pic>
-        <p:nvPicPr>
-          <p:cNvPr id="133" name="Google Shape;133;p9"/>
-          <p:cNvPicPr preferRelativeResize="0"/>
-          <p:nvPr/>
-        </p:nvPicPr>
-        <p:blipFill rotWithShape="1">
-          <a:blip r:embed="rId5">
             <a:alphaModFix/>
           </a:blip>
           <a:srcRect/>
@@ -15563,51 +14952,6 @@
                       </p:childTnLst>
                     </p:cTn>
                   </p:par>
-                  <p:par>
-                    <p:cTn id="15" fill="hold">
-                      <p:stCondLst>
-                        <p:cond delay="indefinite"/>
-                      </p:stCondLst>
-                      <p:childTnLst>
-                        <p:par>
-                          <p:cTn id="16" fill="hold">
-                            <p:stCondLst>
-                              <p:cond delay="0"/>
-                            </p:stCondLst>
-                            <p:childTnLst>
-                              <p:par>
-                                <p:cTn id="17" presetID="1" presetClass="entr" presetSubtype="0" fill="hold" nodeType="clickEffect">
-                                  <p:stCondLst>
-                                    <p:cond delay="0"/>
-                                  </p:stCondLst>
-                                  <p:childTnLst>
-                                    <p:set>
-                                      <p:cBhvr>
-                                        <p:cTn id="18" dur="1" fill="hold">
-                                          <p:stCondLst>
-                                            <p:cond delay="0"/>
-                                          </p:stCondLst>
-                                        </p:cTn>
-                                        <p:tgtEl>
-                                          <p:spTgt spid="132"/>
-                                        </p:tgtEl>
-                                        <p:attrNameLst>
-                                          <p:attrName>style.visibility</p:attrName>
-                                        </p:attrNameLst>
-                                      </p:cBhvr>
-                                      <p:to>
-                                        <p:strVal val="visible"/>
-                                      </p:to>
-                                    </p:set>
-                                  </p:childTnLst>
-                                </p:cTn>
-                              </p:par>
-                            </p:childTnLst>
-                          </p:cTn>
-                        </p:par>
-                      </p:childTnLst>
-                    </p:cTn>
-                  </p:par>
                 </p:childTnLst>
               </p:cTn>
               <p:prevCondLst>
@@ -15636,7 +14980,7 @@
 </p:sld>
 </file>
 
-<file path=ppt/slides/slide14.xml><?xml version="1.0" encoding="utf-8"?>
+<file path=ppt/slides/slide13.xml><?xml version="1.0" encoding="utf-8"?>
 <p:sld xmlns:a="http://schemas.openxmlformats.org/drawingml/2006/main" xmlns:r="http://schemas.openxmlformats.org/officeDocument/2006/relationships" xmlns:p="http://schemas.openxmlformats.org/presentationml/2006/main">
   <p:cSld>
     <p:spTree>
@@ -16401,7 +15745,7 @@
 </p:sld>
 </file>
 
-<file path=ppt/slides/slide15.xml><?xml version="1.0" encoding="utf-8"?>
+<file path=ppt/slides/slide14.xml><?xml version="1.0" encoding="utf-8"?>
 <p:sld xmlns:a="http://schemas.openxmlformats.org/drawingml/2006/main" xmlns:r="http://schemas.openxmlformats.org/officeDocument/2006/relationships" xmlns:p="http://schemas.openxmlformats.org/presentationml/2006/main">
   <p:cSld>
     <p:spTree>
@@ -16714,7 +16058,7 @@
 </p:sld>
 </file>
 
-<file path=ppt/slides/slide16.xml><?xml version="1.0" encoding="utf-8"?>
+<file path=ppt/slides/slide15.xml><?xml version="1.0" encoding="utf-8"?>
 <p:sld xmlns:a="http://schemas.openxmlformats.org/drawingml/2006/main" xmlns:r="http://schemas.openxmlformats.org/officeDocument/2006/relationships" xmlns:p="http://schemas.openxmlformats.org/presentationml/2006/main">
   <p:cSld>
     <p:spTree>
@@ -17203,7 +16547,7 @@
 </p:sld>
 </file>
 
-<file path=ppt/slides/slide17.xml><?xml version="1.0" encoding="utf-8"?>
+<file path=ppt/slides/slide16.xml><?xml version="1.0" encoding="utf-8"?>
 <p:sld xmlns:a="http://schemas.openxmlformats.org/drawingml/2006/main" xmlns:r="http://schemas.openxmlformats.org/officeDocument/2006/relationships" xmlns:p="http://schemas.openxmlformats.org/presentationml/2006/main">
   <p:cSld>
     <p:spTree>
@@ -17473,33 +16817,6 @@
           </a:p>
         </p:txBody>
       </p:sp>
-      <p:pic>
-        <p:nvPicPr>
-          <p:cNvPr id="165" name="Google Shape;165;p13"/>
-          <p:cNvPicPr preferRelativeResize="0"/>
-          <p:nvPr/>
-        </p:nvPicPr>
-        <p:blipFill rotWithShape="1">
-          <a:blip r:embed="rId5">
-            <a:alphaModFix/>
-          </a:blip>
-          <a:srcRect/>
-          <a:stretch/>
-        </p:blipFill>
-        <p:spPr>
-          <a:xfrm>
-            <a:off x="8590973" y="507060"/>
-            <a:ext cx="1438275" cy="790575"/>
-          </a:xfrm>
-          <a:prstGeom prst="rect">
-            <a:avLst/>
-          </a:prstGeom>
-          <a:noFill/>
-          <a:ln>
-            <a:noFill/>
-          </a:ln>
-        </p:spPr>
-      </p:pic>
       <p:sp>
         <p:nvSpPr>
           <p:cNvPr id="8" name="Google Shape;163;p13">
@@ -17924,7 +17241,7 @@
                             </p:stCondLst>
                             <p:childTnLst>
                               <p:par>
-                                <p:cTn id="25" presetID="1" presetClass="entr" presetSubtype="0" fill="hold" nodeType="clickEffect">
+                                <p:cTn id="25" presetID="1" presetClass="entr" presetSubtype="0" fill="hold" grpId="0" nodeType="clickEffect">
                                   <p:stCondLst>
                                     <p:cond delay="0"/>
                                   </p:stCondLst>
@@ -17932,51 +17249,6 @@
                                     <p:set>
                                       <p:cBhvr>
                                         <p:cTn id="26" dur="1" fill="hold">
-                                          <p:stCondLst>
-                                            <p:cond delay="0"/>
-                                          </p:stCondLst>
-                                        </p:cTn>
-                                        <p:tgtEl>
-                                          <p:spTgt spid="165"/>
-                                        </p:tgtEl>
-                                        <p:attrNameLst>
-                                          <p:attrName>style.visibility</p:attrName>
-                                        </p:attrNameLst>
-                                      </p:cBhvr>
-                                      <p:to>
-                                        <p:strVal val="visible"/>
-                                      </p:to>
-                                    </p:set>
-                                  </p:childTnLst>
-                                </p:cTn>
-                              </p:par>
-                            </p:childTnLst>
-                          </p:cTn>
-                        </p:par>
-                      </p:childTnLst>
-                    </p:cTn>
-                  </p:par>
-                  <p:par>
-                    <p:cTn id="27" fill="hold">
-                      <p:stCondLst>
-                        <p:cond delay="indefinite"/>
-                      </p:stCondLst>
-                      <p:childTnLst>
-                        <p:par>
-                          <p:cTn id="28" fill="hold">
-                            <p:stCondLst>
-                              <p:cond delay="0"/>
-                            </p:stCondLst>
-                            <p:childTnLst>
-                              <p:par>
-                                <p:cTn id="29" presetID="1" presetClass="entr" presetSubtype="0" fill="hold" grpId="0" nodeType="clickEffect">
-                                  <p:stCondLst>
-                                    <p:cond delay="0"/>
-                                  </p:stCondLst>
-                                  <p:childTnLst>
-                                    <p:set>
-                                      <p:cBhvr>
-                                        <p:cTn id="30" dur="1" fill="hold">
                                           <p:stCondLst>
                                             <p:cond delay="0"/>
                                           </p:stCondLst>
@@ -18030,7 +17302,7 @@
 </p:sld>
 </file>
 
-<file path=ppt/slides/slide18.xml><?xml version="1.0" encoding="utf-8"?>
+<file path=ppt/slides/slide17.xml><?xml version="1.0" encoding="utf-8"?>
 <p:sld xmlns:a="http://schemas.openxmlformats.org/drawingml/2006/main" xmlns:r="http://schemas.openxmlformats.org/officeDocument/2006/relationships" xmlns:p="http://schemas.openxmlformats.org/presentationml/2006/main">
   <p:cSld>
     <p:spTree>
@@ -18147,10 +17419,10 @@
               <a:buChar char="•"/>
             </a:pPr>
             <a:r>
-              <a:rPr lang="en-CA"/>
+              <a:rPr lang="en-CA" dirty="0"/>
               <a:t>Stands for “Uniform Manifold Approximation and Projection” </a:t>
             </a:r>
-            <a:endParaRPr/>
+            <a:endParaRPr dirty="0"/>
           </a:p>
           <a:p>
             <a:pPr marL="228600" lvl="0" indent="-228600" algn="l" rtl="0">
@@ -18170,10 +17442,10 @@
               <a:buChar char="•"/>
             </a:pPr>
             <a:r>
-              <a:rPr lang="en-CA"/>
+              <a:rPr lang="en-CA" dirty="0"/>
               <a:t>Similar neighborhood approach as t-SNE except uses Riemannian geometry (remember Riemann sums?) to approximate the manifold over which your data lies</a:t>
             </a:r>
-            <a:endParaRPr/>
+            <a:endParaRPr dirty="0"/>
           </a:p>
           <a:p>
             <a:pPr marL="228600" lvl="0" indent="-228600" algn="l" rtl="0">
@@ -18193,10 +17465,10 @@
               <a:buChar char="•"/>
             </a:pPr>
             <a:r>
-              <a:rPr lang="en-CA"/>
+              <a:rPr lang="en-CA" dirty="0"/>
               <a:t> Brass tax: </a:t>
             </a:r>
-            <a:endParaRPr/>
+            <a:endParaRPr dirty="0"/>
           </a:p>
           <a:p>
             <a:pPr marL="685800" lvl="1" indent="-228600" algn="l" rtl="0">
@@ -18216,10 +17488,10 @@
               <a:buChar char="•"/>
             </a:pPr>
             <a:r>
-              <a:rPr lang="en-CA"/>
+              <a:rPr lang="en-CA" dirty="0"/>
               <a:t>Focuses on local data relationships like t-SNE</a:t>
             </a:r>
-            <a:endParaRPr/>
+            <a:endParaRPr dirty="0"/>
           </a:p>
           <a:p>
             <a:pPr marL="685800" lvl="1" indent="-228600" algn="l" rtl="0">
@@ -18239,10 +17511,10 @@
               <a:buChar char="•"/>
             </a:pPr>
             <a:r>
-              <a:rPr lang="en-CA"/>
+              <a:rPr lang="en-CA" dirty="0"/>
               <a:t>faster than t-SNE</a:t>
             </a:r>
-            <a:endParaRPr/>
+            <a:endParaRPr dirty="0"/>
           </a:p>
           <a:p>
             <a:pPr marL="685800" lvl="1" indent="-228600" algn="l" rtl="0">
@@ -18262,10 +17534,10 @@
               <a:buChar char="•"/>
             </a:pPr>
             <a:r>
-              <a:rPr lang="en-CA"/>
+              <a:rPr lang="en-CA" dirty="0"/>
               <a:t>sometimes results in a better low dimensional representation of your data e.g. single cell</a:t>
             </a:r>
-            <a:endParaRPr/>
+            <a:endParaRPr dirty="0"/>
           </a:p>
         </p:txBody>
       </p:sp>
@@ -18720,7 +17992,7 @@
 </p:sld>
 </file>
 
-<file path=ppt/slides/slide19.xml><?xml version="1.0" encoding="utf-8"?>
+<file path=ppt/slides/slide18.xml><?xml version="1.0" encoding="utf-8"?>
 <p:sld xmlns:a="http://schemas.openxmlformats.org/drawingml/2006/main" xmlns:r="http://schemas.openxmlformats.org/officeDocument/2006/relationships" xmlns:p="http://schemas.openxmlformats.org/presentationml/2006/main">
   <p:cSld>
     <p:spTree>
@@ -18846,39 +18118,12 @@
       </p:sp>
       <p:pic>
         <p:nvPicPr>
-          <p:cNvPr id="179" name="Google Shape;179;p15"/>
+          <p:cNvPr id="180" name="Google Shape;180;p15"/>
           <p:cNvPicPr preferRelativeResize="0"/>
           <p:nvPr/>
         </p:nvPicPr>
         <p:blipFill rotWithShape="1">
           <a:blip r:embed="rId3">
-            <a:alphaModFix/>
-          </a:blip>
-          <a:srcRect/>
-          <a:stretch/>
-        </p:blipFill>
-        <p:spPr>
-          <a:xfrm>
-            <a:off x="8900244" y="1107820"/>
-            <a:ext cx="1438275" cy="790575"/>
-          </a:xfrm>
-          <a:prstGeom prst="rect">
-            <a:avLst/>
-          </a:prstGeom>
-          <a:noFill/>
-          <a:ln>
-            <a:noFill/>
-          </a:ln>
-        </p:spPr>
-      </p:pic>
-      <p:pic>
-        <p:nvPicPr>
-          <p:cNvPr id="180" name="Google Shape;180;p15"/>
-          <p:cNvPicPr preferRelativeResize="0"/>
-          <p:nvPr/>
-        </p:nvPicPr>
-        <p:blipFill rotWithShape="1">
-          <a:blip r:embed="rId4">
             <a:alphaModFix/>
           </a:blip>
           <a:srcRect/>
@@ -18905,7 +18150,7 @@
           <p:nvPr/>
         </p:nvPicPr>
         <p:blipFill rotWithShape="1">
-          <a:blip r:embed="rId5">
+          <a:blip r:embed="rId4">
             <a:alphaModFix/>
           </a:blip>
           <a:srcRect/>
@@ -19077,51 +18322,6 @@
                       </p:childTnLst>
                     </p:cTn>
                   </p:par>
-                  <p:par>
-                    <p:cTn id="15" fill="hold">
-                      <p:stCondLst>
-                        <p:cond delay="indefinite"/>
-                      </p:stCondLst>
-                      <p:childTnLst>
-                        <p:par>
-                          <p:cTn id="16" fill="hold">
-                            <p:stCondLst>
-                              <p:cond delay="0"/>
-                            </p:stCondLst>
-                            <p:childTnLst>
-                              <p:par>
-                                <p:cTn id="17" presetID="1" presetClass="entr" presetSubtype="0" fill="hold" nodeType="clickEffect">
-                                  <p:stCondLst>
-                                    <p:cond delay="0"/>
-                                  </p:stCondLst>
-                                  <p:childTnLst>
-                                    <p:set>
-                                      <p:cBhvr>
-                                        <p:cTn id="18" dur="1" fill="hold">
-                                          <p:stCondLst>
-                                            <p:cond delay="0"/>
-                                          </p:stCondLst>
-                                        </p:cTn>
-                                        <p:tgtEl>
-                                          <p:spTgt spid="179"/>
-                                        </p:tgtEl>
-                                        <p:attrNameLst>
-                                          <p:attrName>style.visibility</p:attrName>
-                                        </p:attrNameLst>
-                                      </p:cBhvr>
-                                      <p:to>
-                                        <p:strVal val="visible"/>
-                                      </p:to>
-                                    </p:set>
-                                  </p:childTnLst>
-                                </p:cTn>
-                              </p:par>
-                            </p:childTnLst>
-                          </p:cTn>
-                        </p:par>
-                      </p:childTnLst>
-                    </p:cTn>
-                  </p:par>
                 </p:childTnLst>
               </p:cTn>
               <p:prevCondLst>
@@ -19147,59 +18347,7 @@
 </p:sld>
 </file>
 
-<file path=ppt/slides/slide2.xml><?xml version="1.0" encoding="utf-8"?>
-<p:sld xmlns:a="http://schemas.openxmlformats.org/drawingml/2006/main" xmlns:r="http://schemas.openxmlformats.org/officeDocument/2006/relationships" xmlns:p="http://schemas.openxmlformats.org/presentationml/2006/main">
-  <p:cSld>
-    <p:spTree>
-      <p:nvGrpSpPr>
-        <p:cNvPr id="1" name="Shape 74"/>
-        <p:cNvGrpSpPr/>
-        <p:nvPr/>
-      </p:nvGrpSpPr>
-      <p:grpSpPr>
-        <a:xfrm>
-          <a:off x="0" y="0"/>
-          <a:ext cx="0" cy="0"/>
-          <a:chOff x="0" y="0"/>
-          <a:chExt cx="0" cy="0"/>
-        </a:xfrm>
-      </p:grpSpPr>
-      <p:pic>
-        <p:nvPicPr>
-          <p:cNvPr id="75" name="Google Shape;75;p2" descr="Picture 1.png"/>
-          <p:cNvPicPr preferRelativeResize="0"/>
-          <p:nvPr/>
-        </p:nvPicPr>
-        <p:blipFill rotWithShape="1">
-          <a:blip r:embed="rId3">
-            <a:alphaModFix/>
-          </a:blip>
-          <a:srcRect/>
-          <a:stretch/>
-        </p:blipFill>
-        <p:spPr>
-          <a:xfrm>
-            <a:off x="3640936" y="857250"/>
-            <a:ext cx="4888871" cy="4800600"/>
-          </a:xfrm>
-          <a:prstGeom prst="rect">
-            <a:avLst/>
-          </a:prstGeom>
-          <a:noFill/>
-          <a:ln>
-            <a:noFill/>
-          </a:ln>
-        </p:spPr>
-      </p:pic>
-    </p:spTree>
-  </p:cSld>
-  <p:clrMapOvr>
-    <a:masterClrMapping/>
-  </p:clrMapOvr>
-</p:sld>
-</file>
-
-<file path=ppt/slides/slide20.xml><?xml version="1.0" encoding="utf-8"?>
+<file path=ppt/slides/slide19.xml><?xml version="1.0" encoding="utf-8"?>
 <p:sld xmlns:a="http://schemas.openxmlformats.org/drawingml/2006/main" xmlns:r="http://schemas.openxmlformats.org/officeDocument/2006/relationships" xmlns:p="http://schemas.openxmlformats.org/presentationml/2006/main">
   <p:cSld>
     <p:spTree>
@@ -19929,7 +19077,59 @@
 </p:sld>
 </file>
 
-<file path=ppt/slides/slide21.xml><?xml version="1.0" encoding="utf-8"?>
+<file path=ppt/slides/slide2.xml><?xml version="1.0" encoding="utf-8"?>
+<p:sld xmlns:a="http://schemas.openxmlformats.org/drawingml/2006/main" xmlns:r="http://schemas.openxmlformats.org/officeDocument/2006/relationships" xmlns:p="http://schemas.openxmlformats.org/presentationml/2006/main">
+  <p:cSld>
+    <p:spTree>
+      <p:nvGrpSpPr>
+        <p:cNvPr id="1" name="Shape 74"/>
+        <p:cNvGrpSpPr/>
+        <p:nvPr/>
+      </p:nvGrpSpPr>
+      <p:grpSpPr>
+        <a:xfrm>
+          <a:off x="0" y="0"/>
+          <a:ext cx="0" cy="0"/>
+          <a:chOff x="0" y="0"/>
+          <a:chExt cx="0" cy="0"/>
+        </a:xfrm>
+      </p:grpSpPr>
+      <p:pic>
+        <p:nvPicPr>
+          <p:cNvPr id="75" name="Google Shape;75;p2" descr="Picture 1.png"/>
+          <p:cNvPicPr preferRelativeResize="0"/>
+          <p:nvPr/>
+        </p:nvPicPr>
+        <p:blipFill rotWithShape="1">
+          <a:blip r:embed="rId3">
+            <a:alphaModFix/>
+          </a:blip>
+          <a:srcRect/>
+          <a:stretch/>
+        </p:blipFill>
+        <p:spPr>
+          <a:xfrm>
+            <a:off x="3640936" y="857250"/>
+            <a:ext cx="4888871" cy="4800600"/>
+          </a:xfrm>
+          <a:prstGeom prst="rect">
+            <a:avLst/>
+          </a:prstGeom>
+          <a:noFill/>
+          <a:ln>
+            <a:noFill/>
+          </a:ln>
+        </p:spPr>
+      </p:pic>
+    </p:spTree>
+  </p:cSld>
+  <p:clrMapOvr>
+    <a:masterClrMapping/>
+  </p:clrMapOvr>
+</p:sld>
+</file>
+
+<file path=ppt/slides/slide20.xml><?xml version="1.0" encoding="utf-8"?>
 <p:sld xmlns:a="http://schemas.openxmlformats.org/drawingml/2006/main" xmlns:r="http://schemas.openxmlformats.org/officeDocument/2006/relationships" xmlns:p="http://schemas.openxmlformats.org/presentationml/2006/main">
   <p:cSld>
     <p:spTree>
@@ -20086,7 +19286,7 @@
 </p:sld>
 </file>
 
-<file path=ppt/slides/slide22.xml><?xml version="1.0" encoding="utf-8"?>
+<file path=ppt/slides/slide21.xml><?xml version="1.0" encoding="utf-8"?>
 <p:sld xmlns:a="http://schemas.openxmlformats.org/drawingml/2006/main" xmlns:r="http://schemas.openxmlformats.org/officeDocument/2006/relationships" xmlns:p="http://schemas.openxmlformats.org/presentationml/2006/main">
   <p:cSld>
     <p:spTree>
@@ -20758,56 +19958,6 @@
               <a:t>What is dimensionality reduction?</a:t>
             </a:r>
             <a:endParaRPr lang="en-US"/>
-          </a:p>
-        </p:txBody>
-      </p:sp>
-      <p:sp>
-        <p:nvSpPr>
-          <p:cNvPr id="99" name="Google Shape;99;p5"/>
-          <p:cNvSpPr txBox="1"/>
-          <p:nvPr/>
-        </p:nvSpPr>
-        <p:spPr>
-          <a:xfrm>
-            <a:off x="10886835" y="5939161"/>
-            <a:ext cx="1305165" cy="369332"/>
-          </a:xfrm>
-          <a:prstGeom prst="rect">
-            <a:avLst/>
-          </a:prstGeom>
-          <a:noFill/>
-          <a:ln>
-            <a:noFill/>
-          </a:ln>
-        </p:spPr>
-        <p:txBody>
-          <a:bodyPr spcFirstLastPara="1" wrap="square" lIns="91425" tIns="45700" rIns="91425" bIns="45700" anchor="t" anchorCtr="0">
-            <a:spAutoFit/>
-          </a:bodyPr>
-          <a:lstStyle/>
-          <a:p>
-            <a:pPr marL="0" marR="0" lvl="0" indent="0" algn="l" rtl="0">
-              <a:spcBef>
-                <a:spcPts val="0"/>
-              </a:spcBef>
-              <a:spcAft>
-                <a:spcPts val="0"/>
-              </a:spcAft>
-              <a:buNone/>
-            </a:pPr>
-            <a:r>
-              <a:rPr lang="en-CA" sz="1800">
-                <a:solidFill>
-                  <a:schemeClr val="dk1"/>
-                </a:solidFill>
-                <a:latin typeface="Verdana"/>
-                <a:ea typeface="Verdana"/>
-                <a:cs typeface="Verdana"/>
-                <a:sym typeface="Verdana"/>
-              </a:rPr>
-              <a:t>Wikipedia</a:t>
-            </a:r>
-            <a:endParaRPr/>
           </a:p>
         </p:txBody>
       </p:sp>
@@ -21751,56 +20901,6 @@
       </p:sp>
       <p:sp>
         <p:nvSpPr>
-          <p:cNvPr id="99" name="Google Shape;99;p5"/>
-          <p:cNvSpPr txBox="1"/>
-          <p:nvPr/>
-        </p:nvSpPr>
-        <p:spPr>
-          <a:xfrm>
-            <a:off x="10886835" y="5939161"/>
-            <a:ext cx="1305165" cy="369332"/>
-          </a:xfrm>
-          <a:prstGeom prst="rect">
-            <a:avLst/>
-          </a:prstGeom>
-          <a:noFill/>
-          <a:ln>
-            <a:noFill/>
-          </a:ln>
-        </p:spPr>
-        <p:txBody>
-          <a:bodyPr spcFirstLastPara="1" wrap="square" lIns="91425" tIns="45700" rIns="91425" bIns="45700" anchor="t" anchorCtr="0">
-            <a:spAutoFit/>
-          </a:bodyPr>
-          <a:lstStyle/>
-          <a:p>
-            <a:pPr marL="0" marR="0" lvl="0" indent="0" algn="l" rtl="0">
-              <a:spcBef>
-                <a:spcPts val="0"/>
-              </a:spcBef>
-              <a:spcAft>
-                <a:spcPts val="0"/>
-              </a:spcAft>
-              <a:buNone/>
-            </a:pPr>
-            <a:r>
-              <a:rPr lang="en-CA" sz="1800">
-                <a:solidFill>
-                  <a:schemeClr val="dk1"/>
-                </a:solidFill>
-                <a:latin typeface="Verdana"/>
-                <a:ea typeface="Verdana"/>
-                <a:cs typeface="Verdana"/>
-                <a:sym typeface="Verdana"/>
-              </a:rPr>
-              <a:t>Wikipedia</a:t>
-            </a:r>
-            <a:endParaRPr/>
-          </a:p>
-        </p:txBody>
-      </p:sp>
-      <p:sp>
-        <p:nvSpPr>
           <p:cNvPr id="3" name="Google Shape;105;p6">
             <a:extLst>
               <a:ext uri="{FF2B5EF4-FFF2-40B4-BE49-F238E27FC236}">
@@ -21843,10 +20943,10 @@
               </a:spcBef>
             </a:pPr>
             <a:r>
-              <a:rPr lang="en" sz="1500"/>
+              <a:rPr lang="en" sz="1500" dirty="0"/>
               <a:t>Most widely used </a:t>
             </a:r>
-            <a:endParaRPr lang="en-US" sz="1500"/>
+            <a:endParaRPr lang="en-US" sz="1500" dirty="0"/>
           </a:p>
           <a:p>
             <a:pPr marL="285750" indent="-285750">
@@ -21858,8 +20958,8 @@
               </a:spcBef>
             </a:pPr>
             <a:r>
-              <a:rPr lang="en" sz="1500"/>
-              <a:t>One step in analyses pipeline</a:t>
+              <a:rPr lang="en" sz="1500" dirty="0"/>
+              <a:t>One step in analysis workflow (See Module 1)</a:t>
             </a:r>
           </a:p>
           <a:p>
@@ -21872,7 +20972,7 @@
               </a:spcBef>
             </a:pPr>
             <a:r>
-              <a:rPr lang="en" sz="1500"/>
+              <a:rPr lang="en" sz="1500" dirty="0"/>
               <a:t>"PCA reduces data by geometrically projecting them onto lower dimensions called principal components (PCs), with the goal of finding the best summary of the data using a limited number of PCs"</a:t>
             </a:r>
           </a:p>
@@ -21886,7 +20986,7 @@
               </a:spcBef>
             </a:pPr>
             <a:r>
-              <a:rPr lang="en" sz="1500"/>
+              <a:rPr lang="en" sz="1500" dirty="0"/>
               <a:t>Find the biggest axes of variation</a:t>
             </a:r>
           </a:p>
@@ -21900,7 +21000,7 @@
               </a:spcBef>
             </a:pPr>
             <a:r>
-              <a:rPr lang="en" sz="1200"/>
+              <a:rPr lang="en" sz="1200" dirty="0"/>
               <a:t>First principal component - PC1 - direction that maximizes the variance of the projected data</a:t>
             </a:r>
           </a:p>
@@ -21914,16 +21014,8 @@
               </a:spcBef>
             </a:pPr>
             <a:r>
-              <a:rPr lang="en" sz="1200"/>
-              <a:t>PC2: </a:t>
-            </a:r>
-            <a:r>
-              <a:rPr lang="en" sz="1200" err="1"/>
-              <a:t>explain’s</a:t>
-            </a:r>
-            <a:r>
-              <a:rPr lang="en" sz="1200"/>
-              <a:t> second most variance</a:t>
+              <a:rPr lang="en" sz="1200" dirty="0"/>
+              <a:t>PC2: explain’s second most variance</a:t>
             </a:r>
           </a:p>
           <a:p>
@@ -21936,16 +21028,8 @@
               </a:spcBef>
             </a:pPr>
             <a:r>
-              <a:rPr lang="en" sz="1200" err="1"/>
-              <a:t>etc</a:t>
-            </a:r>
-            <a:r>
-              <a:rPr lang="en" sz="1200"/>
-              <a:t> </a:t>
-            </a:r>
-            <a:r>
-              <a:rPr lang="en" sz="1200" err="1"/>
-              <a:t>etc</a:t>
+              <a:rPr lang="en" sz="1200" dirty="0"/>
+              <a:t>etc etc</a:t>
             </a:r>
           </a:p>
           <a:p>
@@ -21959,10 +21043,10 @@
               <a:buFont typeface="Arial,Sans-Serif"/>
             </a:pPr>
             <a:r>
-              <a:rPr lang="en-CA" sz="1500"/>
+              <a:rPr lang="en-CA" sz="1500" dirty="0"/>
               <a:t>Shows where the dominant structure in your data is (maybe a missing variable?)</a:t>
             </a:r>
-            <a:endParaRPr lang="en-US" sz="1500"/>
+            <a:endParaRPr lang="en-US" sz="1500" dirty="0"/>
           </a:p>
           <a:p>
             <a:pPr marL="228600" indent="-228600">
@@ -21975,18 +21059,18 @@
               <a:buFont typeface="Arial,Sans-Serif"/>
             </a:pPr>
             <a:r>
-              <a:rPr lang="en-CA" sz="1500"/>
+              <a:rPr lang="en-CA" sz="1500" dirty="0"/>
               <a:t>Useful for identifying batches, unmeasured variable effect, </a:t>
             </a:r>
             <a:r>
-              <a:rPr lang="en-CA" sz="1500" err="1"/>
+              <a:rPr lang="en-CA" sz="1500" dirty="0" err="1"/>
               <a:t>etc</a:t>
             </a:r>
             <a:r>
-              <a:rPr lang="en-CA" sz="1500"/>
+              <a:rPr lang="en-CA" sz="1500" dirty="0"/>
               <a:t> </a:t>
             </a:r>
-            <a:endParaRPr lang="en-US" sz="1500"/>
+            <a:endParaRPr lang="en-US" sz="1500" dirty="0"/>
           </a:p>
           <a:p>
             <a:pPr marL="742950" lvl="1" indent="-285750">
@@ -21997,7 +21081,7 @@
                 <a:spcPts val="0"/>
               </a:spcBef>
             </a:pPr>
-            <a:endParaRPr lang="en" sz="1200"/>
+            <a:endParaRPr lang="en" sz="1200" dirty="0"/>
           </a:p>
           <a:p>
             <a:pPr marL="742950" lvl="1" indent="-285750">
@@ -22008,7 +21092,7 @@
                 <a:spcPts val="0"/>
               </a:spcBef>
             </a:pPr>
-            <a:endParaRPr lang="en" sz="1200"/>
+            <a:endParaRPr lang="en" sz="1200" dirty="0"/>
           </a:p>
           <a:p>
             <a:pPr marL="285750" indent="-285750">
@@ -22019,7 +21103,7 @@
                 <a:spcPts val="0"/>
               </a:spcBef>
             </a:pPr>
-            <a:endParaRPr lang="en" sz="1500"/>
+            <a:endParaRPr lang="en" sz="1500" dirty="0"/>
           </a:p>
         </p:txBody>
       </p:sp>
@@ -22593,56 +21677,6 @@
       </p:sp>
       <p:sp>
         <p:nvSpPr>
-          <p:cNvPr id="99" name="Google Shape;99;p5"/>
-          <p:cNvSpPr txBox="1"/>
-          <p:nvPr/>
-        </p:nvSpPr>
-        <p:spPr>
-          <a:xfrm>
-            <a:off x="10886835" y="5939161"/>
-            <a:ext cx="1305165" cy="369332"/>
-          </a:xfrm>
-          <a:prstGeom prst="rect">
-            <a:avLst/>
-          </a:prstGeom>
-          <a:noFill/>
-          <a:ln>
-            <a:noFill/>
-          </a:ln>
-        </p:spPr>
-        <p:txBody>
-          <a:bodyPr spcFirstLastPara="1" wrap="square" lIns="91425" tIns="45700" rIns="91425" bIns="45700" anchor="t" anchorCtr="0">
-            <a:spAutoFit/>
-          </a:bodyPr>
-          <a:lstStyle/>
-          <a:p>
-            <a:pPr marL="0" marR="0" lvl="0" indent="0" algn="l" rtl="0">
-              <a:spcBef>
-                <a:spcPts val="0"/>
-              </a:spcBef>
-              <a:spcAft>
-                <a:spcPts val="0"/>
-              </a:spcAft>
-              <a:buNone/>
-            </a:pPr>
-            <a:r>
-              <a:rPr lang="en-CA" sz="1800">
-                <a:solidFill>
-                  <a:schemeClr val="dk1"/>
-                </a:solidFill>
-                <a:latin typeface="Verdana"/>
-                <a:ea typeface="Verdana"/>
-                <a:cs typeface="Verdana"/>
-                <a:sym typeface="Verdana"/>
-              </a:rPr>
-              <a:t>Wikipedia</a:t>
-            </a:r>
-            <a:endParaRPr/>
-          </a:p>
-        </p:txBody>
-      </p:sp>
-      <p:sp>
-        <p:nvSpPr>
           <p:cNvPr id="5" name="Google Shape;105;p6">
             <a:extLst>
               <a:ext uri="{FF2B5EF4-FFF2-40B4-BE49-F238E27FC236}">
@@ -22685,20 +21719,20 @@
               </a:spcBef>
             </a:pPr>
             <a:r>
-              <a:rPr lang="en" sz="1500"/>
+              <a:rPr lang="en" sz="1500" dirty="0"/>
               <a:t>Consider data with </a:t>
             </a:r>
             <a:r>
-              <a:rPr lang="en" sz="1500">
+              <a:rPr lang="en" sz="1500" dirty="0">
                 <a:latin typeface="Courier New"/>
               </a:rPr>
               <a:t>p</a:t>
             </a:r>
             <a:r>
-              <a:rPr lang="en" sz="1500"/>
+              <a:rPr lang="en" sz="1500" dirty="0"/>
               <a:t> variables</a:t>
             </a:r>
-            <a:endParaRPr lang="en-US"/>
+            <a:endParaRPr lang="en-US" dirty="0"/>
           </a:p>
           <a:p>
             <a:pPr marL="285750" indent="-285750">
@@ -22710,7 +21744,7 @@
               </a:spcBef>
             </a:pPr>
             <a:r>
-              <a:rPr lang="en" sz="1500"/>
+              <a:rPr lang="en" sz="1500" dirty="0"/>
               <a:t>Examine variable correlations</a:t>
             </a:r>
           </a:p>
@@ -22724,27 +21758,27 @@
               </a:spcBef>
             </a:pPr>
             <a:r>
-              <a:rPr lang="en" sz="1200"/>
+              <a:rPr lang="en" sz="1200" dirty="0"/>
               <a:t>when </a:t>
             </a:r>
             <a:r>
-              <a:rPr lang="en" sz="1200">
+              <a:rPr lang="en" sz="1200" dirty="0">
                 <a:latin typeface="Courier New"/>
               </a:rPr>
               <a:t>p=10</a:t>
             </a:r>
             <a:r>
-              <a:rPr lang="en" sz="1200"/>
+              <a:rPr lang="en" sz="1200" dirty="0"/>
               <a:t> there are</a:t>
             </a:r>
             <a:r>
-              <a:rPr lang="en" sz="1200">
+              <a:rPr lang="en" sz="1200" dirty="0">
                 <a:latin typeface="Courier New"/>
               </a:rPr>
               <a:t> p(p−1)/2=45</a:t>
             </a:r>
             <a:r>
-              <a:rPr lang="en" sz="1200"/>
+              <a:rPr lang="en" sz="1200" dirty="0"/>
               <a:t> scatterplots that could be analyzed</a:t>
             </a:r>
           </a:p>
@@ -22758,19 +21792,19 @@
               </a:spcBef>
             </a:pPr>
             <a:r>
-              <a:rPr lang="en" sz="1200"/>
+              <a:rPr lang="en" sz="1200" dirty="0"/>
               <a:t>PCA – retains </a:t>
             </a:r>
             <a:r>
-              <a:rPr lang="en" sz="1200" i="1" u="sng"/>
+              <a:rPr lang="en" sz="1200" i="1" u="sng" dirty="0"/>
               <a:t>interesting</a:t>
             </a:r>
             <a:r>
-              <a:rPr lang="en" sz="1200" i="1"/>
+              <a:rPr lang="en" sz="1200" i="1" dirty="0"/>
               <a:t> </a:t>
             </a:r>
             <a:r>
-              <a:rPr lang="en" sz="1200"/>
+              <a:rPr lang="en" sz="1200" dirty="0"/>
               <a:t>dimensions</a:t>
             </a:r>
           </a:p>
@@ -22784,11 +21818,11 @@
               </a:spcBef>
             </a:pPr>
             <a:r>
-              <a:rPr lang="en" sz="1200" i="1" u="sng"/>
+              <a:rPr lang="en" sz="1200" i="1" u="sng" dirty="0"/>
               <a:t>interesting</a:t>
             </a:r>
             <a:r>
-              <a:rPr lang="en" sz="1200"/>
+              <a:rPr lang="en" sz="1200" dirty="0"/>
               <a:t> is measured by the amount that the observations vary along each dimension</a:t>
             </a:r>
           </a:p>
@@ -22802,148 +21836,56 @@
               </a:spcBef>
             </a:pPr>
             <a:r>
-              <a:rPr lang="en" sz="1200"/>
+              <a:rPr lang="en" sz="1200" dirty="0"/>
               <a:t>New axes or dimensions or PCs are a linear combination of the </a:t>
             </a:r>
             <a:r>
-              <a:rPr lang="en" sz="1200" i="1"/>
+              <a:rPr lang="en" sz="1200" i="1" dirty="0"/>
               <a:t>p</a:t>
             </a:r>
             <a:r>
-              <a:rPr lang="en" sz="1200"/>
+              <a:rPr lang="en" sz="1200" dirty="0"/>
               <a:t> features</a:t>
             </a:r>
           </a:p>
           <a:p>
             <a:pPr marL="285750"/>
             <a:r>
-              <a:rPr lang="en" sz="1500"/>
+              <a:rPr lang="en" sz="1500" dirty="0"/>
               <a:t>Variables in data set </a:t>
             </a:r>
             <a:r>
-              <a:rPr lang="en" sz="1500">
+              <a:rPr lang="en" sz="1500" dirty="0">
                 <a:latin typeface="Courier New"/>
               </a:rPr>
               <a:t>X</a:t>
             </a:r>
             <a:r>
-              <a:rPr lang="en" sz="1500" baseline="-25000">
+              <a:rPr lang="en" sz="1500" baseline="-25000" dirty="0">
                 <a:latin typeface="Courier New"/>
               </a:rPr>
               <a:t>1</a:t>
             </a:r>
             <a:r>
-              <a:rPr lang="en" sz="1500">
+              <a:rPr lang="en" sz="1500" dirty="0">
                 <a:latin typeface="Courier New"/>
               </a:rPr>
               <a:t>,X</a:t>
             </a:r>
             <a:r>
-              <a:rPr lang="en" sz="1500" baseline="-25000">
+              <a:rPr lang="en" sz="1500" baseline="-25000" dirty="0">
                 <a:latin typeface="Courier New"/>
               </a:rPr>
               <a:t>2</a:t>
             </a:r>
             <a:r>
-              <a:rPr lang="en" sz="1500">
+              <a:rPr lang="en" sz="1500" dirty="0">
                 <a:latin typeface="Courier New"/>
               </a:rPr>
-              <a:t>,...,</a:t>
+              <a:t>,...,X</a:t>
             </a:r>
             <a:r>
-              <a:rPr lang="en" sz="1500" err="1">
-                <a:latin typeface="Courier New"/>
-              </a:rPr>
-              <a:t>X</a:t>
-            </a:r>
-            <a:r>
-              <a:rPr lang="en" sz="1500" baseline="-25000" err="1">
-                <a:latin typeface="Courier New"/>
-              </a:rPr>
-              <a:t>p</a:t>
-            </a:r>
-            <a:endParaRPr lang="en" sz="1500" baseline="-25000">
-              <a:latin typeface="Courier New"/>
-            </a:endParaRPr>
-          </a:p>
-          <a:p>
-            <a:pPr marL="0" indent="457200">
-              <a:lnSpc>
-                <a:spcPct val="150000"/>
-              </a:lnSpc>
-              <a:spcBef>
-                <a:spcPts val="0"/>
-              </a:spcBef>
-              <a:buNone/>
-            </a:pPr>
-            <a:r>
-              <a:rPr lang="en" sz="1500">
-                <a:latin typeface="Courier New"/>
-              </a:rPr>
-              <a:t>PC1 = ϕ</a:t>
-            </a:r>
-            <a:r>
-              <a:rPr lang="en" sz="1500" baseline="-25000">
-                <a:latin typeface="Courier New"/>
-              </a:rPr>
-              <a:t>11</a:t>
-            </a:r>
-            <a:r>
-              <a:rPr lang="en" sz="1500">
-                <a:latin typeface="Courier New"/>
-              </a:rPr>
-              <a:t>X</a:t>
-            </a:r>
-            <a:r>
-              <a:rPr lang="en" sz="1500" baseline="-25000">
-                <a:latin typeface="Courier New"/>
-              </a:rPr>
-              <a:t>1 </a:t>
-            </a:r>
-            <a:r>
-              <a:rPr lang="en" sz="1500">
-                <a:latin typeface="Courier New"/>
-              </a:rPr>
-              <a:t>+ ϕ</a:t>
-            </a:r>
-            <a:r>
-              <a:rPr lang="en" sz="1500" baseline="-25000">
-                <a:latin typeface="Courier New"/>
-              </a:rPr>
-              <a:t>21</a:t>
-            </a:r>
-            <a:r>
-              <a:rPr lang="en" sz="1500">
-                <a:latin typeface="Courier New"/>
-              </a:rPr>
-              <a:t>X</a:t>
-            </a:r>
-            <a:r>
-              <a:rPr lang="en" sz="1500" baseline="-25000">
-                <a:latin typeface="Courier New"/>
-              </a:rPr>
-              <a:t>2 </a:t>
-            </a:r>
-            <a:r>
-              <a:rPr lang="en" sz="1500">
-                <a:latin typeface="Courier New"/>
-              </a:rPr>
-              <a:t>+ ... + ϕ</a:t>
-            </a:r>
-            <a:r>
-              <a:rPr lang="en" sz="1500" baseline="-25000">
-                <a:latin typeface="Courier New"/>
-              </a:rPr>
-              <a:t>p1</a:t>
-            </a:r>
-            <a:r>
-              <a:rPr lang="en" sz="1500">
-                <a:latin typeface="Courier New"/>
-              </a:rPr>
-              <a:t>X</a:t>
-            </a:r>
-            <a:r>
-              <a:rPr lang="en" sz="1500" baseline="-25000">
+              <a:rPr lang="en" sz="1500" baseline="-25000" dirty="0">
                 <a:latin typeface="Courier New"/>
               </a:rPr>
               <a:t>p</a:t>
@@ -22960,104 +21902,73 @@
               <a:buNone/>
             </a:pPr>
             <a:r>
-              <a:rPr lang="en" sz="1500" baseline="-25000"/>
-              <a:t>PC1 is the new axis with largest variance</a:t>
-            </a:r>
-            <a:endParaRPr lang="en" sz="1500"/>
-          </a:p>
-          <a:p>
-            <a:pPr marL="0" indent="457200">
-              <a:lnSpc>
-                <a:spcPct val="150000"/>
-              </a:lnSpc>
-              <a:spcBef>
-                <a:spcPts val="0"/>
-              </a:spcBef>
-              <a:buNone/>
-            </a:pPr>
-            <a:r>
-              <a:rPr lang="en" sz="1500" baseline="-25000"/>
-              <a:t>PC2 another axis that's uncorrelated to PC1.</a:t>
-            </a:r>
-          </a:p>
-          <a:p>
-            <a:pPr marL="0" indent="457200">
-              <a:lnSpc>
-                <a:spcPct val="150000"/>
-              </a:lnSpc>
-              <a:spcBef>
-                <a:spcPts val="0"/>
-              </a:spcBef>
-              <a:buNone/>
-            </a:pPr>
-            <a:r>
-              <a:rPr lang="en" sz="1300">
+              <a:rPr lang="en" sz="1500" dirty="0">
                 <a:latin typeface="Courier New"/>
               </a:rPr>
-              <a:t>PC2 = ϕ</a:t>
+              <a:t>PC1 = ϕ</a:t>
             </a:r>
             <a:r>
-              <a:rPr lang="en" sz="1300" baseline="-25000">
+              <a:rPr lang="en" sz="1500" baseline="-25000" dirty="0">
                 <a:latin typeface="Courier New"/>
               </a:rPr>
-              <a:t>12</a:t>
+              <a:t>11</a:t>
             </a:r>
             <a:r>
-              <a:rPr lang="en" sz="1300">
+              <a:rPr lang="en" sz="1500" dirty="0">
                 <a:latin typeface="Courier New"/>
               </a:rPr>
               <a:t>X</a:t>
             </a:r>
             <a:r>
-              <a:rPr lang="en" sz="1300" baseline="-25000">
+              <a:rPr lang="en" sz="1500" baseline="-25000" dirty="0">
                 <a:latin typeface="Courier New"/>
               </a:rPr>
               <a:t>1 </a:t>
             </a:r>
             <a:r>
-              <a:rPr lang="en" sz="1300">
+              <a:rPr lang="en" sz="1500" dirty="0">
                 <a:latin typeface="Courier New"/>
               </a:rPr>
               <a:t>+ ϕ</a:t>
             </a:r>
             <a:r>
-              <a:rPr lang="en" sz="1300" baseline="-25000">
+              <a:rPr lang="en" sz="1500" baseline="-25000" dirty="0">
                 <a:latin typeface="Courier New"/>
               </a:rPr>
-              <a:t>22</a:t>
+              <a:t>21</a:t>
             </a:r>
             <a:r>
-              <a:rPr lang="en" sz="1300">
+              <a:rPr lang="en" sz="1500" dirty="0">
                 <a:latin typeface="Courier New"/>
               </a:rPr>
               <a:t>X</a:t>
             </a:r>
             <a:r>
-              <a:rPr lang="en" sz="1300" baseline="-25000">
+              <a:rPr lang="en" sz="1500" baseline="-25000" dirty="0">
                 <a:latin typeface="Courier New"/>
               </a:rPr>
               <a:t>2 </a:t>
             </a:r>
             <a:r>
-              <a:rPr lang="en" sz="1300">
+              <a:rPr lang="en" sz="1500" dirty="0">
                 <a:latin typeface="Courier New"/>
               </a:rPr>
-              <a:t>+ ...+  ϕ</a:t>
+              <a:t>+ ... + ϕ</a:t>
             </a:r>
             <a:r>
-              <a:rPr lang="en" sz="1300" baseline="-25000">
+              <a:rPr lang="en" sz="1500" baseline="-25000" dirty="0">
                 <a:latin typeface="Courier New"/>
               </a:rPr>
-              <a:t>p2</a:t>
+              <a:t>p1</a:t>
             </a:r>
             <a:r>
-              <a:rPr lang="en" sz="1300">
+              <a:rPr lang="en" sz="1500" dirty="0">
                 <a:latin typeface="Courier New"/>
               </a:rPr>
               <a:t>X</a:t>
             </a:r>
             <a:r>
-              <a:rPr lang="en" sz="1300" baseline="-25000">
+              <a:rPr lang="en" sz="1500" baseline="-25000" dirty="0">
                 <a:latin typeface="Courier New"/>
               </a:rPr>
               <a:t>p</a:t>
@@ -23074,10 +21985,124 @@
               <a:buNone/>
             </a:pPr>
             <a:r>
-              <a:rPr lang="en" sz="1500" baseline="-25000"/>
+              <a:rPr lang="en" sz="1500" baseline="-25000" dirty="0"/>
+              <a:t>PC1 is the new axis with largest variance</a:t>
+            </a:r>
+            <a:endParaRPr lang="en" sz="1500" dirty="0"/>
+          </a:p>
+          <a:p>
+            <a:pPr marL="0" indent="457200">
+              <a:lnSpc>
+                <a:spcPct val="150000"/>
+              </a:lnSpc>
+              <a:spcBef>
+                <a:spcPts val="0"/>
+              </a:spcBef>
+              <a:buNone/>
+            </a:pPr>
+            <a:r>
+              <a:rPr lang="en" sz="1500" baseline="-25000" dirty="0"/>
+              <a:t>PC2 another axis that's uncorrelated to PC1.</a:t>
+            </a:r>
+          </a:p>
+          <a:p>
+            <a:pPr marL="0" indent="457200">
+              <a:lnSpc>
+                <a:spcPct val="150000"/>
+              </a:lnSpc>
+              <a:spcBef>
+                <a:spcPts val="0"/>
+              </a:spcBef>
+              <a:buNone/>
+            </a:pPr>
+            <a:r>
+              <a:rPr lang="en" sz="1300" dirty="0">
+                <a:latin typeface="Courier New"/>
+              </a:rPr>
+              <a:t>PC2 = ϕ</a:t>
+            </a:r>
+            <a:r>
+              <a:rPr lang="en" sz="1300" baseline="-25000" dirty="0">
+                <a:latin typeface="Courier New"/>
+              </a:rPr>
+              <a:t>12</a:t>
+            </a:r>
+            <a:r>
+              <a:rPr lang="en" sz="1300" dirty="0">
+                <a:latin typeface="Courier New"/>
+              </a:rPr>
+              <a:t>X</a:t>
+            </a:r>
+            <a:r>
+              <a:rPr lang="en" sz="1300" baseline="-25000" dirty="0">
+                <a:latin typeface="Courier New"/>
+              </a:rPr>
+              <a:t>1 </a:t>
+            </a:r>
+            <a:r>
+              <a:rPr lang="en" sz="1300" dirty="0">
+                <a:latin typeface="Courier New"/>
+              </a:rPr>
+              <a:t>+ ϕ</a:t>
+            </a:r>
+            <a:r>
+              <a:rPr lang="en" sz="1300" baseline="-25000" dirty="0">
+                <a:latin typeface="Courier New"/>
+              </a:rPr>
+              <a:t>22</a:t>
+            </a:r>
+            <a:r>
+              <a:rPr lang="en" sz="1300" dirty="0">
+                <a:latin typeface="Courier New"/>
+              </a:rPr>
+              <a:t>X</a:t>
+            </a:r>
+            <a:r>
+              <a:rPr lang="en" sz="1300" baseline="-25000" dirty="0">
+                <a:latin typeface="Courier New"/>
+              </a:rPr>
+              <a:t>2 </a:t>
+            </a:r>
+            <a:r>
+              <a:rPr lang="en" sz="1300" dirty="0">
+                <a:latin typeface="Courier New"/>
+              </a:rPr>
+              <a:t>+ ...+  ϕ</a:t>
+            </a:r>
+            <a:r>
+              <a:rPr lang="en" sz="1300" baseline="-25000" dirty="0">
+                <a:latin typeface="Courier New"/>
+              </a:rPr>
+              <a:t>p2</a:t>
+            </a:r>
+            <a:r>
+              <a:rPr lang="en" sz="1300" dirty="0">
+                <a:latin typeface="Courier New"/>
+              </a:rPr>
+              <a:t>X</a:t>
+            </a:r>
+            <a:r>
+              <a:rPr lang="en" sz="1300" baseline="-25000" dirty="0">
+                <a:latin typeface="Courier New"/>
+              </a:rPr>
+              <a:t>p</a:t>
+            </a:r>
+          </a:p>
+          <a:p>
+            <a:pPr marL="0" indent="457200">
+              <a:lnSpc>
+                <a:spcPct val="150000"/>
+              </a:lnSpc>
+              <a:spcBef>
+                <a:spcPts val="0"/>
+              </a:spcBef>
+              <a:buNone/>
+            </a:pPr>
+            <a:r>
+              <a:rPr lang="en" sz="1500" baseline="-25000" dirty="0"/>
               <a:t>Coefficients are stored in a ‘PCA loading matrix’</a:t>
             </a:r>
-            <a:endParaRPr lang="en" sz="1500"/>
+            <a:endParaRPr lang="en" sz="1500" dirty="0"/>
           </a:p>
         </p:txBody>
       </p:sp>
@@ -23747,153 +22772,6 @@
   <p:cSld>
     <p:spTree>
       <p:nvGrpSpPr>
-        <p:cNvPr id="1" name="Shape 96"/>
-        <p:cNvGrpSpPr/>
-        <p:nvPr/>
-      </p:nvGrpSpPr>
-      <p:grpSpPr>
-        <a:xfrm>
-          <a:off x="0" y="0"/>
-          <a:ext cx="0" cy="0"/>
-          <a:chOff x="0" y="0"/>
-          <a:chExt cx="0" cy="0"/>
-        </a:xfrm>
-      </p:grpSpPr>
-      <p:sp>
-        <p:nvSpPr>
-          <p:cNvPr id="97" name="Google Shape;97;p5"/>
-          <p:cNvSpPr txBox="1">
-            <a:spLocks noGrp="1"/>
-          </p:cNvSpPr>
-          <p:nvPr>
-            <p:ph type="title"/>
-          </p:nvPr>
-        </p:nvSpPr>
-        <p:spPr>
-          <a:xfrm>
-            <a:off x="482723" y="178694"/>
-            <a:ext cx="11226553" cy="1325563"/>
-          </a:xfrm>
-          <a:prstGeom prst="rect">
-            <a:avLst/>
-          </a:prstGeom>
-          <a:noFill/>
-          <a:ln>
-            <a:noFill/>
-          </a:ln>
-        </p:spPr>
-        <p:txBody>
-          <a:bodyPr spcFirstLastPara="1" wrap="square" lIns="91425" tIns="45700" rIns="91425" bIns="45700" anchor="ctr" anchorCtr="0">
-            <a:normAutofit/>
-          </a:bodyPr>
-          <a:lstStyle/>
-          <a:p>
-            <a:r>
-              <a:rPr lang="en-CA" sz="4000"/>
-              <a:t>How does PCA work?</a:t>
-            </a:r>
-            <a:endParaRPr lang="en-US"/>
-          </a:p>
-        </p:txBody>
-      </p:sp>
-      <p:sp>
-        <p:nvSpPr>
-          <p:cNvPr id="99" name="Google Shape;99;p5"/>
-          <p:cNvSpPr txBox="1"/>
-          <p:nvPr/>
-        </p:nvSpPr>
-        <p:spPr>
-          <a:xfrm>
-            <a:off x="10886835" y="5939161"/>
-            <a:ext cx="1305165" cy="369332"/>
-          </a:xfrm>
-          <a:prstGeom prst="rect">
-            <a:avLst/>
-          </a:prstGeom>
-          <a:noFill/>
-          <a:ln>
-            <a:noFill/>
-          </a:ln>
-        </p:spPr>
-        <p:txBody>
-          <a:bodyPr spcFirstLastPara="1" wrap="square" lIns="91425" tIns="45700" rIns="91425" bIns="45700" anchor="t" anchorCtr="0">
-            <a:spAutoFit/>
-          </a:bodyPr>
-          <a:lstStyle/>
-          <a:p>
-            <a:pPr marL="0" marR="0" lvl="0" indent="0" algn="l" rtl="0">
-              <a:spcBef>
-                <a:spcPts val="0"/>
-              </a:spcBef>
-              <a:spcAft>
-                <a:spcPts val="0"/>
-              </a:spcAft>
-              <a:buNone/>
-            </a:pPr>
-            <a:r>
-              <a:rPr lang="en-CA" sz="1800">
-                <a:solidFill>
-                  <a:schemeClr val="dk1"/>
-                </a:solidFill>
-                <a:latin typeface="Verdana"/>
-                <a:ea typeface="Verdana"/>
-                <a:cs typeface="Verdana"/>
-                <a:sym typeface="Verdana"/>
-              </a:rPr>
-              <a:t>Wikipedia</a:t>
-            </a:r>
-            <a:endParaRPr/>
-          </a:p>
-        </p:txBody>
-      </p:sp>
-      <p:pic>
-        <p:nvPicPr>
-          <p:cNvPr id="2" name="Picture 2" descr="Chart&#10;&#10;Description automatically generated">
-            <a:extLst>
-              <a:ext uri="{FF2B5EF4-FFF2-40B4-BE49-F238E27FC236}">
-                <a16:creationId xmlns:a16="http://schemas.microsoft.com/office/drawing/2014/main" id="{A68EBB7D-4464-A41F-81A5-C9AF9387C0BB}"/>
-              </a:ext>
-            </a:extLst>
-          </p:cNvPr>
-          <p:cNvPicPr>
-            <a:picLocks noChangeAspect="1"/>
-          </p:cNvPicPr>
-          <p:nvPr/>
-        </p:nvPicPr>
-        <p:blipFill>
-          <a:blip r:embed="rId3"/>
-          <a:stretch>
-            <a:fillRect/>
-          </a:stretch>
-        </p:blipFill>
-        <p:spPr>
-          <a:xfrm>
-            <a:off x="1422400" y="2073910"/>
-            <a:ext cx="8566150" cy="3415030"/>
-          </a:xfrm>
-          <a:prstGeom prst="rect">
-            <a:avLst/>
-          </a:prstGeom>
-        </p:spPr>
-      </p:pic>
-    </p:spTree>
-    <p:extLst>
-      <p:ext uri="{BB962C8B-B14F-4D97-AF65-F5344CB8AC3E}">
-        <p14:creationId xmlns:p14="http://schemas.microsoft.com/office/powerpoint/2010/main" val="1538726095"/>
-      </p:ext>
-    </p:extLst>
-  </p:cSld>
-  <p:clrMapOvr>
-    <a:masterClrMapping/>
-  </p:clrMapOvr>
-</p:sld>
-</file>
-
-<file path=ppt/slides/slide9.xml><?xml version="1.0" encoding="utf-8"?>
-<p:sld xmlns:a="http://schemas.openxmlformats.org/drawingml/2006/main" xmlns:r="http://schemas.openxmlformats.org/officeDocument/2006/relationships" xmlns:p="http://schemas.openxmlformats.org/presentationml/2006/main">
-  <p:cSld>
-    <p:spTree>
-      <p:nvGrpSpPr>
         <p:cNvPr id="1" name="Shape 103"/>
         <p:cNvGrpSpPr/>
         <p:nvPr/>
@@ -24579,6 +23457,330 @@
                                     <p:set>
                                       <p:cBhvr>
                                         <p:cTn id="30" dur="1" fill="hold">
+                                          <p:stCondLst>
+                                            <p:cond delay="0"/>
+                                          </p:stCondLst>
+                                        </p:cTn>
+                                        <p:tgtEl>
+                                          <p:spTgt spid="106"/>
+                                        </p:tgtEl>
+                                        <p:attrNameLst>
+                                          <p:attrName>style.visibility</p:attrName>
+                                        </p:attrNameLst>
+                                      </p:cBhvr>
+                                      <p:to>
+                                        <p:strVal val="visible"/>
+                                      </p:to>
+                                    </p:set>
+                                  </p:childTnLst>
+                                </p:cTn>
+                              </p:par>
+                            </p:childTnLst>
+                          </p:cTn>
+                        </p:par>
+                      </p:childTnLst>
+                    </p:cTn>
+                  </p:par>
+                </p:childTnLst>
+              </p:cTn>
+              <p:prevCondLst>
+                <p:cond evt="onPrev" delay="0">
+                  <p:tgtEl>
+                    <p:sldTgt/>
+                  </p:tgtEl>
+                </p:cond>
+              </p:prevCondLst>
+              <p:nextCondLst>
+                <p:cond evt="onNext" delay="0">
+                  <p:tgtEl>
+                    <p:sldTgt/>
+                  </p:tgtEl>
+                </p:cond>
+              </p:nextCondLst>
+            </p:seq>
+          </p:childTnLst>
+        </p:cTn>
+      </p:par>
+    </p:tnLst>
+    <p:bldLst>
+      <p:bldP spid="106" grpId="0"/>
+    </p:bldLst>
+  </p:timing>
+</p:sld>
+</file>
+
+<file path=ppt/slides/slide9.xml><?xml version="1.0" encoding="utf-8"?>
+<p:sld xmlns:a="http://schemas.openxmlformats.org/drawingml/2006/main" xmlns:r="http://schemas.openxmlformats.org/officeDocument/2006/relationships" xmlns:p="http://schemas.openxmlformats.org/presentationml/2006/main">
+  <p:cSld>
+    <p:spTree>
+      <p:nvGrpSpPr>
+        <p:cNvPr id="1" name="Shape 103"/>
+        <p:cNvGrpSpPr/>
+        <p:nvPr/>
+      </p:nvGrpSpPr>
+      <p:grpSpPr>
+        <a:xfrm>
+          <a:off x="0" y="0"/>
+          <a:ext cx="0" cy="0"/>
+          <a:chOff x="0" y="0"/>
+          <a:chExt cx="0" cy="0"/>
+        </a:xfrm>
+      </p:grpSpPr>
+      <p:sp>
+        <p:nvSpPr>
+          <p:cNvPr id="104" name="Google Shape;104;p6"/>
+          <p:cNvSpPr txBox="1">
+            <a:spLocks noGrp="1"/>
+          </p:cNvSpPr>
+          <p:nvPr>
+            <p:ph type="title"/>
+          </p:nvPr>
+        </p:nvSpPr>
+        <p:spPr>
+          <a:xfrm>
+            <a:off x="749423" y="191143"/>
+            <a:ext cx="10515600" cy="1325563"/>
+          </a:xfrm>
+          <a:prstGeom prst="rect">
+            <a:avLst/>
+          </a:prstGeom>
+          <a:noFill/>
+          <a:ln>
+            <a:noFill/>
+          </a:ln>
+        </p:spPr>
+        <p:txBody>
+          <a:bodyPr spcFirstLastPara="1" wrap="square" lIns="91425" tIns="45700" rIns="91425" bIns="45700" anchor="ctr" anchorCtr="0">
+            <a:normAutofit/>
+          </a:bodyPr>
+          <a:lstStyle/>
+          <a:p>
+            <a:pPr marL="0" lvl="0" indent="0" algn="l" rtl="0">
+              <a:lnSpc>
+                <a:spcPct val="90000"/>
+              </a:lnSpc>
+              <a:spcBef>
+                <a:spcPts val="0"/>
+              </a:spcBef>
+              <a:spcAft>
+                <a:spcPts val="0"/>
+              </a:spcAft>
+              <a:buClr>
+                <a:schemeClr val="dk1"/>
+              </a:buClr>
+              <a:buSzPts val="4000"/>
+              <a:buFont typeface="Consolas"/>
+              <a:buNone/>
+            </a:pPr>
+            <a:r>
+              <a:rPr lang="en-CA" sz="4000"/>
+              <a:t>PCA: base r function “prcomp”</a:t>
+            </a:r>
+            <a:endParaRPr/>
+          </a:p>
+        </p:txBody>
+      </p:sp>
+      <p:sp>
+        <p:nvSpPr>
+          <p:cNvPr id="106" name="Google Shape;106;p6"/>
+          <p:cNvSpPr txBox="1"/>
+          <p:nvPr/>
+        </p:nvSpPr>
+        <p:spPr>
+          <a:xfrm>
+            <a:off x="542925" y="6076950"/>
+            <a:ext cx="8476788" cy="369332"/>
+          </a:xfrm>
+          <a:prstGeom prst="rect">
+            <a:avLst/>
+          </a:prstGeom>
+          <a:noFill/>
+          <a:ln>
+            <a:noFill/>
+          </a:ln>
+        </p:spPr>
+        <p:txBody>
+          <a:bodyPr spcFirstLastPara="1" wrap="square" lIns="91425" tIns="45700" rIns="91425" bIns="45700" anchor="t" anchorCtr="0">
+            <a:spAutoFit/>
+          </a:bodyPr>
+          <a:lstStyle/>
+          <a:p>
+            <a:pPr marL="0" marR="0" lvl="0" indent="0" algn="l" rtl="0">
+              <a:spcBef>
+                <a:spcPts val="0"/>
+              </a:spcBef>
+              <a:spcAft>
+                <a:spcPts val="0"/>
+              </a:spcAft>
+              <a:buNone/>
+            </a:pPr>
+            <a:r>
+              <a:rPr lang="en-CA" sz="1800">
+                <a:solidFill>
+                  <a:schemeClr val="dk1"/>
+                </a:solidFill>
+                <a:latin typeface="Verdana"/>
+                <a:ea typeface="Verdana"/>
+                <a:cs typeface="Verdana"/>
+                <a:sym typeface="Verdana"/>
+              </a:rPr>
+              <a:t>A useful PCA paper: </a:t>
+            </a:r>
+            <a:r>
+              <a:rPr lang="en-CA" sz="1800" u="sng">
+                <a:solidFill>
+                  <a:schemeClr val="dk1"/>
+                </a:solidFill>
+                <a:latin typeface="Verdana"/>
+                <a:ea typeface="Verdana"/>
+                <a:cs typeface="Verdana"/>
+                <a:sym typeface="Verdana"/>
+                <a:hlinkClick r:id="rId3"/>
+              </a:rPr>
+              <a:t>https://www.cs.cmu.edu/~elaw/papers/pca.pdf</a:t>
+            </a:r>
+            <a:endParaRPr sz="1800">
+              <a:solidFill>
+                <a:schemeClr val="dk1"/>
+              </a:solidFill>
+              <a:latin typeface="Verdana"/>
+              <a:ea typeface="Verdana"/>
+              <a:cs typeface="Verdana"/>
+              <a:sym typeface="Verdana"/>
+            </a:endParaRPr>
+          </a:p>
+        </p:txBody>
+      </p:sp>
+      <p:sp>
+        <p:nvSpPr>
+          <p:cNvPr id="105" name="Google Shape;105;p6"/>
+          <p:cNvSpPr txBox="1">
+            <a:spLocks noGrp="1"/>
+          </p:cNvSpPr>
+          <p:nvPr>
+            <p:ph type="body" idx="1"/>
+          </p:nvPr>
+        </p:nvSpPr>
+        <p:spPr>
+          <a:xfrm>
+            <a:off x="3352800" y="2266006"/>
+            <a:ext cx="3536950" cy="427038"/>
+          </a:xfrm>
+          <a:prstGeom prst="rect">
+            <a:avLst/>
+          </a:prstGeom>
+          <a:noFill/>
+          <a:ln>
+            <a:noFill/>
+          </a:ln>
+        </p:spPr>
+        <p:txBody>
+          <a:bodyPr spcFirstLastPara="1" wrap="square" lIns="91425" tIns="45700" rIns="91425" bIns="45700" anchor="t" anchorCtr="0">
+            <a:normAutofit lnSpcReduction="10000"/>
+          </a:bodyPr>
+          <a:lstStyle/>
+          <a:p>
+            <a:pPr marL="0" indent="0">
+              <a:lnSpc>
+                <a:spcPct val="80000"/>
+              </a:lnSpc>
+              <a:spcBef>
+                <a:spcPts val="0"/>
+              </a:spcBef>
+              <a:buSzPts val="2800"/>
+              <a:buNone/>
+            </a:pPr>
+            <a:r>
+              <a:rPr lang="en-CA" sz="2800"/>
+              <a:t>Switch to exercise</a:t>
+            </a:r>
+            <a:endParaRPr lang="en-US" sz="2800"/>
+          </a:p>
+        </p:txBody>
+      </p:sp>
+    </p:spTree>
+  </p:cSld>
+  <p:clrMapOvr>
+    <a:masterClrMapping/>
+  </p:clrMapOvr>
+  <p:timing>
+    <p:tnLst>
+      <p:par>
+        <p:cTn id="1" dur="indefinite" restart="never" nodeType="tmRoot">
+          <p:childTnLst>
+            <p:seq concurrent="1" nextAc="seek">
+              <p:cTn id="2" dur="indefinite" nodeType="mainSeq">
+                <p:childTnLst>
+                  <p:par>
+                    <p:cTn id="3" fill="hold">
+                      <p:stCondLst>
+                        <p:cond delay="indefinite"/>
+                      </p:stCondLst>
+                      <p:childTnLst>
+                        <p:par>
+                          <p:cTn id="4" fill="hold">
+                            <p:stCondLst>
+                              <p:cond delay="0"/>
+                            </p:stCondLst>
+                            <p:childTnLst>
+                              <p:par>
+                                <p:cTn id="5" presetID="1" presetClass="entr" presetSubtype="0" fill="hold" nodeType="clickEffect">
+                                  <p:stCondLst>
+                                    <p:cond delay="0"/>
+                                  </p:stCondLst>
+                                  <p:childTnLst>
+                                    <p:set>
+                                      <p:cBhvr>
+                                        <p:cTn id="6" dur="1" fill="hold">
+                                          <p:stCondLst>
+                                            <p:cond delay="0"/>
+                                          </p:stCondLst>
+                                        </p:cTn>
+                                        <p:tgtEl>
+                                          <p:spTgt spid="105">
+                                            <p:txEl>
+                                              <p:pRg st="0" end="0"/>
+                                            </p:txEl>
+                                          </p:spTgt>
+                                        </p:tgtEl>
+                                        <p:attrNameLst>
+                                          <p:attrName>style.visibility</p:attrName>
+                                        </p:attrNameLst>
+                                      </p:cBhvr>
+                                      <p:to>
+                                        <p:strVal val="visible"/>
+                                      </p:to>
+                                    </p:set>
+                                  </p:childTnLst>
+                                </p:cTn>
+                              </p:par>
+                            </p:childTnLst>
+                          </p:cTn>
+                        </p:par>
+                      </p:childTnLst>
+                    </p:cTn>
+                  </p:par>
+                  <p:par>
+                    <p:cTn id="7" fill="hold">
+                      <p:stCondLst>
+                        <p:cond delay="indefinite"/>
+                      </p:stCondLst>
+                      <p:childTnLst>
+                        <p:par>
+                          <p:cTn id="8" fill="hold">
+                            <p:stCondLst>
+                              <p:cond delay="0"/>
+                            </p:stCondLst>
+                            <p:childTnLst>
+                              <p:par>
+                                <p:cTn id="9" presetID="1" presetClass="entr" presetSubtype="0" fill="hold" grpId="0" nodeType="clickEffect">
+                                  <p:stCondLst>
+                                    <p:cond delay="0"/>
+                                  </p:stCondLst>
+                                  <p:childTnLst>
+                                    <p:set>
+                                      <p:cBhvr>
+                                        <p:cTn id="10" dur="1" fill="hold">
                                           <p:stCondLst>
                                             <p:cond delay="0"/>
                                           </p:stCondLst>

</xml_diff>